<commit_message>
doc: update farm ppt
</commit_message>
<xml_diff>
--- a/paper-notes/resource-management-infra/FaRM.pptx
+++ b/paper-notes/resource-management-infra/FaRM.pptx
@@ -29,7 +29,7 @@
     <p:sldId id="267" r:id="rId20"/>
     <p:sldId id="285" r:id="rId21"/>
     <p:sldId id="268" r:id="rId22"/>
-    <p:sldId id="286" r:id="rId23"/>
+    <p:sldId id="293" r:id="rId23"/>
     <p:sldId id="287" r:id="rId24"/>
     <p:sldId id="269" r:id="rId25"/>
     <p:sldId id="292" r:id="rId26"/>
@@ -229,7 +229,7 @@
           <a:p>
             <a:fld id="{1DA43E0E-4712-AF4C-B2DC-48D117232A78}" type="datetimeFigureOut">
               <a:rPr kumimoji="1" lang="zh-CN" altLang="en-US" smtClean="0"/>
-              <a:t>2019/4/21</a:t>
+              <a:t>2019/4/25</a:t>
             </a:fld>
             <a:endParaRPr kumimoji="1" lang="zh-CN" altLang="en-US"/>
           </a:p>
@@ -1597,55 +1597,7 @@
                 <a:ea typeface="+mn-ea"/>
                 <a:cs typeface="+mn-cs"/>
               </a:rPr>
-              <a:t>会失败。在这种情况下，</a:t>
-            </a:r>
-            <a:r>
-              <a:rPr lang="en-US" altLang="zh-CN" sz="1200" b="0" i="0" u="none" strike="noStrike" kern="1200" dirty="0">
-                <a:solidFill>
-                  <a:schemeClr val="tx1"/>
-                </a:solidFill>
-                <a:effectLst/>
-                <a:latin typeface="+mn-lt"/>
-                <a:ea typeface="+mn-ea"/>
-                <a:cs typeface="+mn-cs"/>
-              </a:rPr>
-              <a:t>coordinator</a:t>
-            </a:r>
-            <a:r>
-              <a:rPr lang="zh-CN" altLang="en-US" sz="1200" b="0" i="0" u="none" strike="noStrike" kern="1200" dirty="0">
-                <a:solidFill>
-                  <a:schemeClr val="tx1"/>
-                </a:solidFill>
-                <a:effectLst/>
-                <a:latin typeface="+mn-lt"/>
-                <a:ea typeface="+mn-ea"/>
-                <a:cs typeface="+mn-cs"/>
-              </a:rPr>
-              <a:t>中止事务。它将一个中止记录写入所有</a:t>
-            </a:r>
-            <a:r>
-              <a:rPr lang="en-US" altLang="zh-CN" sz="1200" b="0" i="0" u="none" strike="noStrike" kern="1200" dirty="0">
-                <a:solidFill>
-                  <a:schemeClr val="tx1"/>
-                </a:solidFill>
-                <a:effectLst/>
-                <a:latin typeface="+mn-lt"/>
-                <a:ea typeface="+mn-ea"/>
-                <a:cs typeface="+mn-cs"/>
-              </a:rPr>
-              <a:t>primary</a:t>
-            </a:r>
-            <a:r>
-              <a:rPr lang="zh-CN" altLang="en-US" sz="1200" b="0" i="0" u="none" strike="noStrike" kern="1200" dirty="0">
-                <a:solidFill>
-                  <a:schemeClr val="tx1"/>
-                </a:solidFill>
-                <a:effectLst/>
-                <a:latin typeface="+mn-lt"/>
-                <a:ea typeface="+mn-ea"/>
-                <a:cs typeface="+mn-cs"/>
-              </a:rPr>
-              <a:t>，并向应用程序返回一个错误。</a:t>
+              <a:t>会失败。</a:t>
             </a:r>
             <a:endParaRPr lang="en-US" altLang="zh-CN" sz="1200" b="0" i="0" u="none" strike="noStrike" kern="1200" dirty="0">
               <a:solidFill>
@@ -2532,7 +2484,7 @@
                 <a:ea typeface="+mn-ea"/>
                 <a:cs typeface="+mn-cs"/>
               </a:rPr>
-              <a:t>，一个类似的系统，对于一致性，它可能会采取的措施就是利用租约，系统保证它存储的对象在其租约到期之前不会发生变化。但是</a:t>
+              <a:t>，一个类似的系统，对于一致性，它可能会采取的措施就是利用租约。但是</a:t>
             </a:r>
             <a:r>
               <a:rPr lang="en-US" altLang="zh-CN" sz="1200" b="0" i="0" u="none" strike="noStrike" kern="1200" dirty="0">
@@ -2604,141 +2556,7 @@
                 <a:ea typeface="+mn-ea"/>
                 <a:cs typeface="+mn-cs"/>
               </a:rPr>
-              <a:t>网卡不支持租约识别，因此不管怎么样</a:t>
-            </a:r>
-            <a:r>
-              <a:rPr lang="en-US" altLang="zh-CN" sz="1200" b="0" i="0" u="none" strike="noStrike" kern="1200" dirty="0" err="1">
-                <a:solidFill>
-                  <a:schemeClr val="tx1"/>
-                </a:solidFill>
-                <a:effectLst/>
-                <a:latin typeface="+mn-lt"/>
-                <a:ea typeface="+mn-ea"/>
-                <a:cs typeface="+mn-cs"/>
-              </a:rPr>
-              <a:t>nic</a:t>
-            </a:r>
-            <a:r>
-              <a:rPr lang="zh-CN" altLang="en-US" sz="1200" b="0" i="0" u="none" strike="noStrike" kern="1200" dirty="0">
-                <a:solidFill>
-                  <a:schemeClr val="tx1"/>
-                </a:solidFill>
-                <a:effectLst/>
-                <a:latin typeface="+mn-lt"/>
-                <a:ea typeface="+mn-ea"/>
-                <a:cs typeface="+mn-cs"/>
-              </a:rPr>
-              <a:t>一定会返回一个</a:t>
-            </a:r>
-            <a:r>
-              <a:rPr lang="en-US" altLang="zh-CN" sz="1200" b="0" i="0" u="none" strike="noStrike" kern="1200" dirty="0">
-                <a:solidFill>
-                  <a:schemeClr val="tx1"/>
-                </a:solidFill>
-                <a:effectLst/>
-                <a:latin typeface="+mn-lt"/>
-                <a:ea typeface="+mn-ea"/>
-                <a:cs typeface="+mn-cs"/>
-              </a:rPr>
-              <a:t>response</a:t>
-            </a:r>
-            <a:r>
-              <a:rPr lang="zh-CN" altLang="en-US" sz="1200" b="0" i="0" u="none" strike="noStrike" kern="1200" dirty="0">
-                <a:solidFill>
-                  <a:schemeClr val="tx1"/>
-                </a:solidFill>
-                <a:effectLst/>
-                <a:latin typeface="+mn-lt"/>
-                <a:ea typeface="+mn-ea"/>
-                <a:cs typeface="+mn-cs"/>
-              </a:rPr>
-              <a:t>。从这个角度而言，论文需要去重新设计一个故障恢复。对于这一点，论文实现了一个精确的成员关系，失败后，新配置中的所有机器必须在允许对象突变之前就其成员资格达成一致。</a:t>
-            </a:r>
-          </a:p>
-          <a:p>
-            <a:r>
-              <a:rPr lang="zh-CN" altLang="en-US" sz="1200" b="0" i="0" u="none" strike="noStrike" kern="1200" dirty="0">
-                <a:solidFill>
-                  <a:schemeClr val="tx1"/>
-                </a:solidFill>
-                <a:effectLst/>
-                <a:latin typeface="+mn-lt"/>
-                <a:ea typeface="+mn-ea"/>
-                <a:cs typeface="+mn-cs"/>
-              </a:rPr>
-              <a:t>再比如，单边</a:t>
-            </a:r>
-            <a:r>
-              <a:rPr lang="en-US" altLang="zh-CN" sz="1200" b="0" i="0" u="none" strike="noStrike" kern="1200" dirty="0">
-                <a:solidFill>
-                  <a:schemeClr val="tx1"/>
-                </a:solidFill>
-                <a:effectLst/>
-                <a:latin typeface="+mn-lt"/>
-                <a:ea typeface="+mn-ea"/>
-                <a:cs typeface="+mn-cs"/>
-              </a:rPr>
-              <a:t>RDMA</a:t>
-            </a:r>
-            <a:r>
-              <a:rPr lang="zh-CN" altLang="en-US" sz="1200" b="0" i="0" u="none" strike="noStrike" kern="1200" dirty="0">
-                <a:solidFill>
-                  <a:schemeClr val="tx1"/>
-                </a:solidFill>
-                <a:effectLst/>
-                <a:latin typeface="+mn-lt"/>
-                <a:ea typeface="+mn-ea"/>
-                <a:cs typeface="+mn-cs"/>
-              </a:rPr>
-              <a:t>写入也会影响事务恢复。跨配置一致性的一般方法是拒绝来自旧配置的消息。</a:t>
-            </a:r>
-            <a:r>
-              <a:rPr lang="en-US" altLang="zh-CN" sz="1200" b="0" i="0" u="none" strike="noStrike" kern="1200" dirty="0">
-                <a:solidFill>
-                  <a:schemeClr val="tx1"/>
-                </a:solidFill>
-                <a:effectLst/>
-                <a:latin typeface="+mn-lt"/>
-                <a:ea typeface="+mn-ea"/>
-                <a:cs typeface="+mn-cs"/>
-              </a:rPr>
-              <a:t>FaRM</a:t>
-            </a:r>
-            <a:r>
-              <a:rPr lang="zh-CN" altLang="en-US" sz="1200" b="0" i="0" u="none" strike="noStrike" kern="1200" dirty="0">
-                <a:solidFill>
-                  <a:schemeClr val="tx1"/>
-                </a:solidFill>
-                <a:effectLst/>
-                <a:latin typeface="+mn-lt"/>
-                <a:ea typeface="+mn-ea"/>
-                <a:cs typeface="+mn-cs"/>
-              </a:rPr>
-              <a:t>无法使用此方法，我们通过</a:t>
-            </a:r>
-            <a:r>
-              <a:rPr lang="en-US" altLang="zh-CN" sz="1200" b="0" i="0" u="none" strike="noStrike" kern="1200" dirty="0">
-                <a:solidFill>
-                  <a:schemeClr val="tx1"/>
-                </a:solidFill>
-                <a:effectLst/>
-                <a:latin typeface="+mn-lt"/>
-                <a:ea typeface="+mn-ea"/>
-                <a:cs typeface="+mn-cs"/>
-              </a:rPr>
-              <a:t>Drain logs</a:t>
-            </a:r>
-            <a:r>
-              <a:rPr lang="zh-CN" altLang="en-US" sz="1200" b="0" i="0" u="none" strike="noStrike" kern="1200" dirty="0">
-                <a:solidFill>
-                  <a:schemeClr val="tx1"/>
-                </a:solidFill>
-                <a:effectLst/>
-                <a:latin typeface="+mn-lt"/>
-                <a:ea typeface="+mn-ea"/>
-                <a:cs typeface="+mn-cs"/>
-              </a:rPr>
-              <a:t>来解决这个问题，以确保在恢复过程中处理所有相关的记录。</a:t>
+              <a:t>网卡不支持租约识别。从这个角度而言，论文需要去重新设计一个故障识别。对于这一点，论文实现了一个精确的成员关系。</a:t>
             </a:r>
             <a:endParaRPr lang="en-US" altLang="zh-CN" sz="1200" b="0" i="0" u="none" strike="noStrike" kern="1200" dirty="0">
               <a:solidFill>
@@ -2752,6 +2570,135 @@
           </a:p>
           <a:p>
             <a:endParaRPr lang="zh-CN" altLang="en-US" sz="1200" b="0" i="0" u="none" strike="noStrike" kern="1200" dirty="0">
+              <a:solidFill>
+                <a:schemeClr val="tx1"/>
+              </a:solidFill>
+              <a:effectLst/>
+              <a:latin typeface="+mn-lt"/>
+              <a:ea typeface="+mn-ea"/>
+              <a:cs typeface="+mn-cs"/>
+            </a:endParaRPr>
+          </a:p>
+          <a:p>
+            <a:r>
+              <a:rPr lang="zh-CN" altLang="en-US" sz="1200" b="0" i="0" u="none" strike="noStrike" kern="1200" dirty="0">
+                <a:solidFill>
+                  <a:schemeClr val="tx1"/>
+                </a:solidFill>
+                <a:effectLst/>
+                <a:latin typeface="+mn-lt"/>
+                <a:ea typeface="+mn-ea"/>
+                <a:cs typeface="+mn-cs"/>
+              </a:rPr>
+              <a:t>再比如，单边</a:t>
+            </a:r>
+            <a:r>
+              <a:rPr lang="en-US" altLang="zh-CN" sz="1200" b="0" i="0" u="none" strike="noStrike" kern="1200" dirty="0">
+                <a:solidFill>
+                  <a:schemeClr val="tx1"/>
+                </a:solidFill>
+                <a:effectLst/>
+                <a:latin typeface="+mn-lt"/>
+                <a:ea typeface="+mn-ea"/>
+                <a:cs typeface="+mn-cs"/>
+              </a:rPr>
+              <a:t>RDMA</a:t>
+            </a:r>
+            <a:r>
+              <a:rPr lang="zh-CN" altLang="en-US" sz="1200" b="0" i="0" u="none" strike="noStrike" kern="1200" dirty="0">
+                <a:solidFill>
+                  <a:schemeClr val="tx1"/>
+                </a:solidFill>
+                <a:effectLst/>
+                <a:latin typeface="+mn-lt"/>
+                <a:ea typeface="+mn-ea"/>
+                <a:cs typeface="+mn-cs"/>
+              </a:rPr>
+              <a:t>写入也会影响事务恢复。跨配置一致性的一般方法是拒绝来自旧配置的消息。</a:t>
+            </a:r>
+            <a:r>
+              <a:rPr lang="en-US" altLang="zh-CN" sz="1200" b="0" i="0" u="none" strike="noStrike" kern="1200" dirty="0">
+                <a:solidFill>
+                  <a:schemeClr val="tx1"/>
+                </a:solidFill>
+                <a:effectLst/>
+                <a:latin typeface="+mn-lt"/>
+                <a:ea typeface="+mn-ea"/>
+                <a:cs typeface="+mn-cs"/>
+              </a:rPr>
+              <a:t>FaRM</a:t>
+            </a:r>
+            <a:r>
+              <a:rPr lang="zh-CN" altLang="en-US" sz="1200" b="0" i="0" u="none" strike="noStrike" kern="1200" dirty="0">
+                <a:solidFill>
+                  <a:schemeClr val="tx1"/>
+                </a:solidFill>
+                <a:effectLst/>
+                <a:latin typeface="+mn-lt"/>
+                <a:ea typeface="+mn-ea"/>
+                <a:cs typeface="+mn-cs"/>
+              </a:rPr>
+              <a:t>无法使用此方法，论文通过</a:t>
+            </a:r>
+            <a:r>
+              <a:rPr lang="en-US" altLang="zh-CN" sz="1200" b="0" i="0" u="none" strike="noStrike" kern="1200" dirty="0">
+                <a:solidFill>
+                  <a:schemeClr val="tx1"/>
+                </a:solidFill>
+                <a:effectLst/>
+                <a:latin typeface="+mn-lt"/>
+                <a:ea typeface="+mn-ea"/>
+                <a:cs typeface="+mn-cs"/>
+              </a:rPr>
+              <a:t>Drain logs</a:t>
+            </a:r>
+            <a:r>
+              <a:rPr lang="zh-CN" altLang="en-US" sz="1200" b="0" i="0" u="none" strike="noStrike" kern="1200" dirty="0">
+                <a:solidFill>
+                  <a:schemeClr val="tx1"/>
+                </a:solidFill>
+                <a:effectLst/>
+                <a:latin typeface="+mn-lt"/>
+                <a:ea typeface="+mn-ea"/>
+                <a:cs typeface="+mn-cs"/>
+              </a:rPr>
+              <a:t>来解决这个问题，以确保在恢复过程中处理所有相关的记录。</a:t>
+            </a:r>
+            <a:endParaRPr lang="en-US" altLang="zh-CN" sz="1200" b="0" i="0" u="none" strike="noStrike" kern="1200" dirty="0">
+              <a:solidFill>
+                <a:schemeClr val="tx1"/>
+              </a:solidFill>
+              <a:effectLst/>
+              <a:latin typeface="+mn-lt"/>
+              <a:ea typeface="+mn-ea"/>
+              <a:cs typeface="+mn-cs"/>
+            </a:endParaRPr>
+          </a:p>
+          <a:p>
+            <a:endParaRPr lang="zh-CN" altLang="en-US" sz="1200" b="0" i="0" u="none" strike="noStrike" kern="1200" dirty="0">
+              <a:solidFill>
+                <a:schemeClr val="tx1"/>
+              </a:solidFill>
+              <a:effectLst/>
+              <a:latin typeface="+mn-lt"/>
+              <a:ea typeface="+mn-ea"/>
+              <a:cs typeface="+mn-cs"/>
+            </a:endParaRPr>
+          </a:p>
+          <a:p>
+            <a:r>
+              <a:rPr lang="zh-CN" altLang="en-US" sz="1200" b="0" i="0" u="none" strike="noStrike" kern="1200" dirty="0">
+                <a:solidFill>
+                  <a:schemeClr val="tx1"/>
+                </a:solidFill>
+                <a:effectLst/>
+                <a:latin typeface="+mn-lt"/>
+                <a:ea typeface="+mn-ea"/>
+                <a:cs typeface="+mn-cs"/>
+              </a:rPr>
+              <a:t>不说了</a:t>
+            </a:r>
+            <a:endParaRPr lang="en-US" altLang="zh-CN" sz="1200" b="0" i="0" u="none" strike="noStrike" kern="1200" dirty="0">
               <a:solidFill>
                 <a:schemeClr val="tx1"/>
               </a:solidFill>
@@ -3738,7 +3685,7 @@
                 <a:ea typeface="+mn-ea"/>
                 <a:cs typeface="+mn-cs"/>
               </a:rPr>
-              <a:t>那么</a:t>
+              <a:t>那么就是</a:t>
             </a:r>
             <a:r>
               <a:rPr lang="en-US" altLang="zh-CN" sz="1200" b="0" i="0" u="none" strike="noStrike" kern="1200" dirty="0">
@@ -3762,7 +3709,7 @@
                 <a:ea typeface="+mn-ea"/>
                 <a:cs typeface="+mn-cs"/>
               </a:rPr>
-              <a:t>是怎么工作的，正如一开始提及的那样，先将新配置写入</a:t>
+              <a:t>是怎么工作的，先将新配置写入</a:t>
             </a:r>
             <a:r>
               <a:rPr lang="en-US" altLang="zh-CN" sz="1200" b="0" i="0" u="none" strike="noStrike" kern="1200" dirty="0" err="1">
@@ -4404,55 +4351,7 @@
                 <a:ea typeface="+mn-ea"/>
                 <a:cs typeface="+mn-cs"/>
               </a:rPr>
-              <a:t>请求，并且会忽略对不在配置中的机器的</a:t>
-            </a:r>
-            <a:r>
-              <a:rPr lang="en-US" altLang="zh-CN" sz="1200" b="0" i="0" u="none" strike="noStrike" kern="1200" dirty="0">
-                <a:solidFill>
-                  <a:schemeClr val="tx1"/>
-                </a:solidFill>
-                <a:effectLst/>
-                <a:latin typeface="+mn-lt"/>
-                <a:ea typeface="+mn-ea"/>
-                <a:cs typeface="+mn-cs"/>
-              </a:rPr>
-              <a:t>RDMA</a:t>
-            </a:r>
-            <a:r>
-              <a:rPr lang="zh-CN" altLang="en-US" sz="1200" b="0" i="0" u="none" strike="noStrike" kern="1200" dirty="0">
-                <a:solidFill>
-                  <a:schemeClr val="tx1"/>
-                </a:solidFill>
-                <a:effectLst/>
-                <a:latin typeface="+mn-lt"/>
-                <a:ea typeface="+mn-ea"/>
-                <a:cs typeface="+mn-cs"/>
-              </a:rPr>
-              <a:t>读操作和</a:t>
-            </a:r>
-            <a:r>
-              <a:rPr lang="en-US" altLang="zh-CN" sz="1200" b="0" i="0" u="none" strike="noStrike" kern="1200" dirty="0">
-                <a:solidFill>
-                  <a:schemeClr val="tx1"/>
-                </a:solidFill>
-                <a:effectLst/>
-                <a:latin typeface="+mn-lt"/>
-                <a:ea typeface="+mn-ea"/>
-                <a:cs typeface="+mn-cs"/>
-              </a:rPr>
-              <a:t>RDMA</a:t>
-            </a:r>
-            <a:r>
-              <a:rPr lang="zh-CN" altLang="en-US" sz="1200" b="0" i="0" u="none" strike="noStrike" kern="1200" dirty="0">
-                <a:solidFill>
-                  <a:schemeClr val="tx1"/>
-                </a:solidFill>
-                <a:effectLst/>
-                <a:latin typeface="+mn-lt"/>
-                <a:ea typeface="+mn-ea"/>
-                <a:cs typeface="+mn-cs"/>
-              </a:rPr>
-              <a:t>写操作的应答。</a:t>
+              <a:t>读写请求。</a:t>
             </a:r>
           </a:p>
           <a:p>
@@ -4604,7 +4503,7 @@
               <a:rPr lang="zh-CN" altLang="en-US" sz="2400" baseline="0" dirty="0">
                 <a:effectLst/>
               </a:rPr>
-              <a:t>，从而隐藏并行和分布式系统的失效。</a:t>
+              <a:t>。</a:t>
             </a:r>
           </a:p>
           <a:p>
@@ -4706,6 +4605,41 @@
           <a:lstStyle/>
           <a:p>
             <a:r>
+              <a:rPr kumimoji="1" lang="zh-CN" altLang="en-US" dirty="0"/>
+              <a:t>但是精确了配置成员以后是不够的。因为</a:t>
+            </a:r>
+            <a:r>
+              <a:rPr kumimoji="1" lang="en-US" altLang="zh-CN" dirty="0"/>
+              <a:t>NIC</a:t>
+            </a:r>
+            <a:r>
+              <a:rPr kumimoji="1" lang="zh-CN" altLang="en-US" dirty="0"/>
+              <a:t>网卡无法拒绝过期配置的信息。</a:t>
+            </a:r>
+            <a:endParaRPr kumimoji="1" lang="en-US" altLang="zh-CN" dirty="0"/>
+          </a:p>
+          <a:p>
+            <a:endParaRPr kumimoji="1" lang="en-US" altLang="zh-CN" dirty="0"/>
+          </a:p>
+          <a:p>
+            <a:pPr marL="0" marR="0" lvl="0" indent="0" algn="l" defTabSz="914400" rtl="0" eaLnBrk="1" fontAlgn="auto" latinLnBrk="0" hangingPunct="1">
+              <a:lnSpc>
+                <a:spcPct val="100000"/>
+              </a:lnSpc>
+              <a:spcBef>
+                <a:spcPts val="0"/>
+              </a:spcBef>
+              <a:spcAft>
+                <a:spcPts val="0"/>
+              </a:spcAft>
+              <a:buClrTx/>
+              <a:buSzTx/>
+              <a:buFontTx/>
+              <a:buNone/>
+              <a:tabLst/>
+              <a:defRPr/>
+            </a:pPr>
+            <a:r>
               <a:rPr lang="zh-CN" altLang="en-US" sz="1200" b="0" i="0" u="none" strike="noStrike" kern="1200" dirty="0">
                 <a:solidFill>
                   <a:schemeClr val="tx1"/>
@@ -4715,93 +4649,7 @@
                 <a:ea typeface="+mn-ea"/>
                 <a:cs typeface="+mn-cs"/>
               </a:rPr>
-              <a:t>修改配置后呢，集群将要恢复那些需要恢复的事务。</a:t>
-            </a:r>
-          </a:p>
-          <a:p>
-            <a:r>
-              <a:rPr lang="zh-CN" altLang="en-US" sz="1200" b="0" i="0" u="none" strike="noStrike" kern="1200" dirty="0">
-                <a:solidFill>
-                  <a:schemeClr val="tx1"/>
-                </a:solidFill>
-                <a:effectLst/>
-                <a:latin typeface="+mn-lt"/>
-                <a:ea typeface="+mn-ea"/>
-                <a:cs typeface="+mn-cs"/>
-              </a:rPr>
-              <a:t>正如我之前提及的那样，在恢复</a:t>
-            </a:r>
-            <a:r>
-              <a:rPr lang="en-US" altLang="zh-CN" sz="1200" b="0" i="0" u="none" strike="noStrike" kern="1200" dirty="0">
-                <a:solidFill>
-                  <a:schemeClr val="tx1"/>
-                </a:solidFill>
-                <a:effectLst/>
-                <a:latin typeface="+mn-lt"/>
-                <a:ea typeface="+mn-ea"/>
-                <a:cs typeface="+mn-cs"/>
-              </a:rPr>
-              <a:t>region</a:t>
-            </a:r>
-            <a:r>
-              <a:rPr lang="zh-CN" altLang="en-US" sz="1200" b="0" i="0" u="none" strike="noStrike" kern="1200" dirty="0">
-                <a:solidFill>
-                  <a:schemeClr val="tx1"/>
-                </a:solidFill>
-                <a:effectLst/>
-                <a:latin typeface="+mn-lt"/>
-                <a:ea typeface="+mn-ea"/>
-                <a:cs typeface="+mn-cs"/>
-              </a:rPr>
-              <a:t>前，需要确保跨配置的一致性，需要</a:t>
-            </a:r>
-            <a:r>
-              <a:rPr lang="en-US" altLang="zh-CN" sz="1200" b="0" i="0" u="none" strike="noStrike" kern="1200" dirty="0">
-                <a:solidFill>
-                  <a:schemeClr val="tx1"/>
-                </a:solidFill>
-                <a:effectLst/>
-                <a:latin typeface="+mn-lt"/>
-                <a:ea typeface="+mn-ea"/>
-                <a:cs typeface="+mn-cs"/>
-              </a:rPr>
-              <a:t>drain transaction logs</a:t>
-            </a:r>
-            <a:r>
-              <a:rPr lang="zh-CN" altLang="en-US" sz="1200" b="0" i="0" u="none" strike="noStrike" kern="1200" dirty="0">
-                <a:solidFill>
-                  <a:schemeClr val="tx1"/>
-                </a:solidFill>
-                <a:effectLst/>
-                <a:latin typeface="+mn-lt"/>
-                <a:ea typeface="+mn-ea"/>
-                <a:cs typeface="+mn-cs"/>
-              </a:rPr>
-              <a:t>，意味着需要处理所有事务</a:t>
-            </a:r>
-            <a:r>
-              <a:rPr lang="en-US" altLang="zh-CN" sz="1200" b="0" i="0" u="none" strike="noStrike" kern="1200" dirty="0">
-                <a:solidFill>
-                  <a:schemeClr val="tx1"/>
-                </a:solidFill>
-                <a:effectLst/>
-                <a:latin typeface="+mn-lt"/>
-                <a:ea typeface="+mn-ea"/>
-                <a:cs typeface="+mn-cs"/>
-              </a:rPr>
-              <a:t>logs</a:t>
-            </a:r>
-            <a:r>
-              <a:rPr lang="zh-CN" altLang="en-US" sz="1200" b="0" i="0" u="none" strike="noStrike" kern="1200" dirty="0">
-                <a:solidFill>
-                  <a:schemeClr val="tx1"/>
-                </a:solidFill>
-                <a:effectLst/>
-                <a:latin typeface="+mn-lt"/>
-                <a:ea typeface="+mn-ea"/>
-                <a:cs typeface="+mn-cs"/>
-              </a:rPr>
-              <a:t>中的所有记录。所以目标就是保证一致性，然后在新的配置上要接管那些在旧的配置上还未执行的</a:t>
+              <a:t>所以目标就是保证一致性，然后在新的配置上要接管那些在旧的配置上还未执行的</a:t>
             </a:r>
             <a:r>
               <a:rPr lang="en-US" altLang="zh-CN" sz="1200" b="0" i="0" u="none" strike="noStrike" kern="1200" dirty="0">
@@ -4859,7 +4707,7 @@
     </p:spTree>
     <p:extLst>
       <p:ext uri="{BB962C8B-B14F-4D97-AF65-F5344CB8AC3E}">
-        <p14:creationId xmlns:p14="http://schemas.microsoft.com/office/powerpoint/2010/main" val="4045942577"/>
+        <p14:creationId xmlns:p14="http://schemas.microsoft.com/office/powerpoint/2010/main" val="203214934"/>
       </p:ext>
     </p:extLst>
   </p:cSld>
@@ -4959,79 +4807,7 @@
                 <a:ea typeface="+mn-ea"/>
                 <a:cs typeface="+mn-cs"/>
               </a:rPr>
-              <a:t>。这个</a:t>
-            </a:r>
-            <a:r>
-              <a:rPr lang="en-US" altLang="zh-CN" sz="1200" b="0" i="0" u="none" strike="noStrike" kern="1200" dirty="0">
-                <a:solidFill>
-                  <a:schemeClr val="tx1"/>
-                </a:solidFill>
-                <a:effectLst/>
-                <a:latin typeface="+mn-lt"/>
-                <a:ea typeface="+mn-ea"/>
-                <a:cs typeface="+mn-cs"/>
-              </a:rPr>
-              <a:t>recovery</a:t>
-            </a:r>
-            <a:r>
-              <a:rPr lang="zh-CN" altLang="en-US" sz="1200" b="0" i="0" u="none" strike="noStrike" kern="1200" dirty="0">
-                <a:solidFill>
-                  <a:schemeClr val="tx1"/>
-                </a:solidFill>
-                <a:effectLst/>
-                <a:latin typeface="+mn-lt"/>
-                <a:ea typeface="+mn-ea"/>
-                <a:cs typeface="+mn-cs"/>
-              </a:rPr>
-              <a:t>会在每一个受影响的</a:t>
-            </a:r>
-            <a:r>
-              <a:rPr lang="en-US" altLang="zh-CN" sz="1200" b="0" i="0" u="none" strike="noStrike" kern="1200" dirty="0">
-                <a:solidFill>
-                  <a:schemeClr val="tx1"/>
-                </a:solidFill>
-                <a:effectLst/>
-                <a:latin typeface="+mn-lt"/>
-                <a:ea typeface="+mn-ea"/>
-                <a:cs typeface="+mn-cs"/>
-              </a:rPr>
-              <a:t>region</a:t>
-            </a:r>
-            <a:r>
-              <a:rPr lang="zh-CN" altLang="en-US" sz="1200" b="0" i="0" u="none" strike="noStrike" kern="1200" dirty="0">
-                <a:solidFill>
-                  <a:schemeClr val="tx1"/>
-                </a:solidFill>
-                <a:effectLst/>
-                <a:latin typeface="+mn-lt"/>
-                <a:ea typeface="+mn-ea"/>
-                <a:cs typeface="+mn-cs"/>
-              </a:rPr>
-              <a:t>都执行，那每个</a:t>
-            </a:r>
-            <a:r>
-              <a:rPr lang="en-US" altLang="zh-CN" sz="1200" b="0" i="0" u="none" strike="noStrike" kern="1200" dirty="0">
-                <a:solidFill>
-                  <a:schemeClr val="tx1"/>
-                </a:solidFill>
-                <a:effectLst/>
-                <a:latin typeface="+mn-lt"/>
-                <a:ea typeface="+mn-ea"/>
-                <a:cs typeface="+mn-cs"/>
-              </a:rPr>
-              <a:t>region</a:t>
-            </a:r>
-            <a:r>
-              <a:rPr lang="zh-CN" altLang="en-US" sz="1200" b="0" i="0" u="none" strike="noStrike" kern="1200" dirty="0">
-                <a:solidFill>
-                  <a:schemeClr val="tx1"/>
-                </a:solidFill>
-                <a:effectLst/>
-                <a:latin typeface="+mn-lt"/>
-                <a:ea typeface="+mn-ea"/>
-                <a:cs typeface="+mn-cs"/>
-              </a:rPr>
-              <a:t>数据都很大，所以这些恢复操作都被设计为并行的。</a:t>
+              <a:t>。</a:t>
             </a:r>
             <a:endParaRPr lang="en-US" altLang="zh-CN" sz="1200" b="0" i="0" u="none" strike="noStrike" kern="1200" dirty="0">
               <a:solidFill>
@@ -5113,7 +4889,7 @@
                 <a:ea typeface="+mn-ea"/>
                 <a:cs typeface="+mn-cs"/>
               </a:rPr>
-              <a:t>去找那些它们需要恢复的事务，它们会把对应</a:t>
+              <a:t>去找那些它们需要恢复的事务，对于</a:t>
             </a:r>
             <a:r>
               <a:rPr lang="en-US" altLang="zh-CN" sz="1200" b="0" i="0" u="none" strike="noStrike" kern="1200" dirty="0">
@@ -5125,6 +4901,139 @@
                 <a:ea typeface="+mn-ea"/>
                 <a:cs typeface="+mn-cs"/>
               </a:rPr>
+              <a:t>FaRM</a:t>
+            </a:r>
+            <a:r>
+              <a:rPr lang="zh-CN" altLang="en-US" sz="1200" b="0" i="0" u="none" strike="noStrike" kern="1200" dirty="0">
+                <a:solidFill>
+                  <a:schemeClr val="tx1"/>
+                </a:solidFill>
+                <a:effectLst/>
+                <a:latin typeface="+mn-lt"/>
+                <a:ea typeface="+mn-ea"/>
+                <a:cs typeface="+mn-cs"/>
+              </a:rPr>
+              <a:t>而言，认为所有受配置更改影响的事务为需要恢复的事务，比如被读取的</a:t>
+            </a:r>
+            <a:r>
+              <a:rPr lang="en-US" altLang="zh-CN" sz="1200" b="0" i="0" u="none" strike="noStrike" kern="1200" dirty="0" err="1">
+                <a:solidFill>
+                  <a:schemeClr val="tx1"/>
+                </a:solidFill>
+                <a:effectLst/>
+                <a:latin typeface="+mn-lt"/>
+                <a:ea typeface="+mn-ea"/>
+                <a:cs typeface="+mn-cs"/>
+              </a:rPr>
+              <a:t>priamry</a:t>
+            </a:r>
+            <a:r>
+              <a:rPr lang="zh-CN" altLang="en-US" sz="1200" b="0" i="0" u="none" strike="noStrike" kern="1200" dirty="0">
+                <a:solidFill>
+                  <a:schemeClr val="tx1"/>
+                </a:solidFill>
+                <a:effectLst/>
+                <a:latin typeface="+mn-lt"/>
+                <a:ea typeface="+mn-ea"/>
+                <a:cs typeface="+mn-cs"/>
+              </a:rPr>
+              <a:t>，写入的</a:t>
+            </a:r>
+            <a:r>
+              <a:rPr lang="en-US" altLang="zh-CN" sz="1200" b="0" i="0" u="none" strike="noStrike" kern="1200" dirty="0">
+                <a:solidFill>
+                  <a:schemeClr val="tx1"/>
+                </a:solidFill>
+                <a:effectLst/>
+                <a:latin typeface="+mn-lt"/>
+                <a:ea typeface="+mn-ea"/>
+                <a:cs typeface="+mn-cs"/>
+              </a:rPr>
+              <a:t>backup</a:t>
+            </a:r>
+            <a:r>
+              <a:rPr lang="zh-CN" altLang="en-US" sz="1200" b="0" i="0" u="none" strike="noStrike" kern="1200" dirty="0">
+                <a:solidFill>
+                  <a:schemeClr val="tx1"/>
+                </a:solidFill>
+                <a:effectLst/>
+                <a:latin typeface="+mn-lt"/>
+                <a:ea typeface="+mn-ea"/>
+                <a:cs typeface="+mn-cs"/>
+              </a:rPr>
+              <a:t>，以及更换了</a:t>
+            </a:r>
+            <a:r>
+              <a:rPr lang="en-US" altLang="zh-CN" sz="1200" b="0" i="0" u="none" strike="noStrike" kern="1200" dirty="0">
+                <a:solidFill>
+                  <a:schemeClr val="tx1"/>
+                </a:solidFill>
+                <a:effectLst/>
+                <a:latin typeface="+mn-lt"/>
+                <a:ea typeface="+mn-ea"/>
+                <a:cs typeface="+mn-cs"/>
+              </a:rPr>
+              <a:t>coordinator</a:t>
+            </a:r>
+          </a:p>
+          <a:p>
+            <a:endParaRPr lang="en-US" altLang="zh-CN" sz="1200" b="0" i="0" u="none" strike="noStrike" kern="1200" dirty="0">
+              <a:solidFill>
+                <a:schemeClr val="tx1"/>
+              </a:solidFill>
+              <a:effectLst/>
+              <a:latin typeface="+mn-lt"/>
+              <a:ea typeface="+mn-ea"/>
+              <a:cs typeface="+mn-cs"/>
+            </a:endParaRPr>
+          </a:p>
+          <a:p>
+            <a:r>
+              <a:rPr lang="zh-CN" altLang="en-US" sz="1200" b="0" i="0" u="none" strike="noStrike" kern="1200" dirty="0">
+                <a:solidFill>
+                  <a:schemeClr val="tx1"/>
+                </a:solidFill>
+                <a:effectLst/>
+                <a:latin typeface="+mn-lt"/>
+                <a:ea typeface="+mn-ea"/>
+                <a:cs typeface="+mn-cs"/>
+              </a:rPr>
+              <a:t>它们会把配置</a:t>
+            </a:r>
+            <a:r>
+              <a:rPr lang="en-US" altLang="zh-CN" sz="1200" b="0" i="0" u="none" strike="noStrike" kern="1200" dirty="0">
+                <a:solidFill>
+                  <a:schemeClr val="tx1"/>
+                </a:solidFill>
+                <a:effectLst/>
+                <a:latin typeface="+mn-lt"/>
+                <a:ea typeface="+mn-ea"/>
+                <a:cs typeface="+mn-cs"/>
+              </a:rPr>
+              <a:t>ID</a:t>
+            </a:r>
+            <a:r>
+              <a:rPr lang="zh-CN" altLang="en-US" sz="1200" b="0" i="0" u="none" strike="noStrike" kern="1200" dirty="0">
+                <a:solidFill>
+                  <a:schemeClr val="tx1"/>
+                </a:solidFill>
+                <a:effectLst/>
+                <a:latin typeface="+mn-lt"/>
+                <a:ea typeface="+mn-ea"/>
+                <a:cs typeface="+mn-cs"/>
+              </a:rPr>
+              <a:t>，</a:t>
+            </a:r>
+            <a:r>
+              <a:rPr lang="en-US" altLang="zh-CN" sz="1200" b="0" i="0" u="none" strike="noStrike" kern="1200" dirty="0">
+                <a:solidFill>
+                  <a:schemeClr val="tx1"/>
+                </a:solidFill>
+                <a:effectLst/>
+                <a:latin typeface="+mn-lt"/>
+                <a:ea typeface="+mn-ea"/>
+                <a:cs typeface="+mn-cs"/>
+              </a:rPr>
               <a:t>region</a:t>
             </a:r>
             <a:r>
@@ -5137,7 +5046,7 @@
                 <a:ea typeface="+mn-ea"/>
                 <a:cs typeface="+mn-cs"/>
               </a:rPr>
-              <a:t>的</a:t>
+              <a:t> </a:t>
             </a:r>
             <a:r>
               <a:rPr lang="en-US" altLang="zh-CN" sz="1200" b="0" i="0" u="none" strike="noStrike" kern="1200" dirty="0">
@@ -5149,6 +5058,174 @@
                 <a:ea typeface="+mn-ea"/>
                 <a:cs typeface="+mn-cs"/>
               </a:rPr>
+              <a:t>id</a:t>
+            </a:r>
+            <a:r>
+              <a:rPr lang="zh-CN" altLang="en-US" sz="1200" b="0" i="0" u="none" strike="noStrike" kern="1200" dirty="0">
+                <a:solidFill>
+                  <a:schemeClr val="tx1"/>
+                </a:solidFill>
+                <a:effectLst/>
+                <a:latin typeface="+mn-lt"/>
+                <a:ea typeface="+mn-ea"/>
+                <a:cs typeface="+mn-cs"/>
+              </a:rPr>
+              <a:t>和需要恢复的事务的</a:t>
+            </a:r>
+            <a:r>
+              <a:rPr lang="en-US" altLang="zh-CN" sz="1200" b="0" i="0" u="none" strike="noStrike" kern="1200" dirty="0">
+                <a:solidFill>
+                  <a:schemeClr val="tx1"/>
+                </a:solidFill>
+                <a:effectLst/>
+                <a:latin typeface="+mn-lt"/>
+                <a:ea typeface="+mn-ea"/>
+                <a:cs typeface="+mn-cs"/>
+              </a:rPr>
+              <a:t>id</a:t>
+            </a:r>
+            <a:r>
+              <a:rPr lang="zh-CN" altLang="en-US" sz="1200" b="0" i="0" u="none" strike="noStrike" kern="1200" dirty="0">
+                <a:solidFill>
+                  <a:schemeClr val="tx1"/>
+                </a:solidFill>
+                <a:effectLst/>
+                <a:latin typeface="+mn-lt"/>
+                <a:ea typeface="+mn-ea"/>
+                <a:cs typeface="+mn-cs"/>
+              </a:rPr>
+              <a:t>发送给</a:t>
+            </a:r>
+            <a:r>
+              <a:rPr lang="en-US" altLang="zh-CN" sz="1200" b="0" i="0" u="none" strike="noStrike" kern="1200" dirty="0">
+                <a:solidFill>
+                  <a:schemeClr val="tx1"/>
+                </a:solidFill>
+                <a:effectLst/>
+                <a:latin typeface="+mn-lt"/>
+                <a:ea typeface="+mn-ea"/>
+                <a:cs typeface="+mn-cs"/>
+              </a:rPr>
+              <a:t>primary</a:t>
+            </a:r>
+            <a:r>
+              <a:rPr lang="zh-CN" altLang="en-US" sz="1200" b="0" i="0" u="none" strike="noStrike" kern="1200" dirty="0">
+                <a:solidFill>
+                  <a:schemeClr val="tx1"/>
+                </a:solidFill>
+                <a:effectLst/>
+                <a:latin typeface="+mn-lt"/>
+                <a:ea typeface="+mn-ea"/>
+                <a:cs typeface="+mn-cs"/>
+              </a:rPr>
+              <a:t>，在</a:t>
+            </a:r>
+            <a:r>
+              <a:rPr lang="en-US" altLang="zh-CN" sz="1200" b="0" i="0" u="none" strike="noStrike" kern="1200" dirty="0">
+                <a:solidFill>
+                  <a:schemeClr val="tx1"/>
+                </a:solidFill>
+                <a:effectLst/>
+                <a:latin typeface="+mn-lt"/>
+                <a:ea typeface="+mn-ea"/>
+                <a:cs typeface="+mn-cs"/>
+              </a:rPr>
+              <a:t>primary</a:t>
+            </a:r>
+            <a:r>
+              <a:rPr lang="zh-CN" altLang="en-US" sz="1200" b="0" i="0" u="none" strike="noStrike" kern="1200" dirty="0">
+                <a:solidFill>
+                  <a:schemeClr val="tx1"/>
+                </a:solidFill>
+                <a:effectLst/>
+                <a:latin typeface="+mn-lt"/>
+                <a:ea typeface="+mn-ea"/>
+                <a:cs typeface="+mn-cs"/>
+              </a:rPr>
+              <a:t>拿到所有</a:t>
+            </a:r>
+            <a:r>
+              <a:rPr lang="en-US" altLang="zh-CN" sz="1200" b="0" i="0" u="none" strike="noStrike" kern="1200" dirty="0">
+                <a:solidFill>
+                  <a:schemeClr val="tx1"/>
+                </a:solidFill>
+                <a:effectLst/>
+                <a:latin typeface="+mn-lt"/>
+                <a:ea typeface="+mn-ea"/>
+                <a:cs typeface="+mn-cs"/>
+              </a:rPr>
+              <a:t>message</a:t>
+            </a:r>
+            <a:r>
+              <a:rPr lang="zh-CN" altLang="en-US" sz="1200" b="0" i="0" u="none" strike="noStrike" kern="1200" dirty="0">
+                <a:solidFill>
+                  <a:schemeClr val="tx1"/>
+                </a:solidFill>
+                <a:effectLst/>
+                <a:latin typeface="+mn-lt"/>
+                <a:ea typeface="+mn-ea"/>
+                <a:cs typeface="+mn-cs"/>
+              </a:rPr>
+              <a:t>后，</a:t>
+            </a:r>
+            <a:r>
+              <a:rPr lang="en-US" altLang="zh-CN" sz="1200" b="0" i="0" u="none" strike="noStrike" kern="1200" dirty="0">
+                <a:solidFill>
+                  <a:schemeClr val="tx1"/>
+                </a:solidFill>
+                <a:effectLst/>
+                <a:latin typeface="+mn-lt"/>
+                <a:ea typeface="+mn-ea"/>
+                <a:cs typeface="+mn-cs"/>
+              </a:rPr>
+              <a:t>primary</a:t>
+            </a:r>
+            <a:r>
+              <a:rPr lang="zh-CN" altLang="en-US" sz="1200" b="0" i="0" u="none" strike="noStrike" kern="1200" dirty="0">
+                <a:solidFill>
+                  <a:schemeClr val="tx1"/>
+                </a:solidFill>
+                <a:effectLst/>
+                <a:latin typeface="+mn-lt"/>
+                <a:ea typeface="+mn-ea"/>
+                <a:cs typeface="+mn-cs"/>
+              </a:rPr>
+              <a:t>会重新去获取这些</a:t>
+            </a:r>
+            <a:r>
+              <a:rPr lang="en-US" altLang="zh-CN" sz="1200" b="0" i="0" u="none" strike="noStrike" kern="1200" dirty="0">
+                <a:solidFill>
+                  <a:schemeClr val="tx1"/>
+                </a:solidFill>
+                <a:effectLst/>
+                <a:latin typeface="+mn-lt"/>
+                <a:ea typeface="+mn-ea"/>
+                <a:cs typeface="+mn-cs"/>
+              </a:rPr>
+              <a:t>region</a:t>
+            </a:r>
+            <a:r>
+              <a:rPr lang="zh-CN" altLang="en-US" sz="1200" b="0" i="0" u="none" strike="noStrike" kern="1200" dirty="0">
+                <a:solidFill>
+                  <a:schemeClr val="tx1"/>
+                </a:solidFill>
+                <a:effectLst/>
+                <a:latin typeface="+mn-lt"/>
+                <a:ea typeface="+mn-ea"/>
+                <a:cs typeface="+mn-cs"/>
+              </a:rPr>
+              <a:t>的对应</a:t>
+            </a:r>
+            <a:r>
+              <a:rPr lang="en-US" altLang="zh-CN" sz="1200" b="0" i="0" u="none" strike="noStrike" kern="1200" dirty="0">
+                <a:solidFill>
+                  <a:schemeClr val="tx1"/>
+                </a:solidFill>
+                <a:effectLst/>
+                <a:latin typeface="+mn-lt"/>
+                <a:ea typeface="+mn-ea"/>
+                <a:cs typeface="+mn-cs"/>
+              </a:rPr>
               <a:t>log</a:t>
             </a:r>
             <a:r>
@@ -5161,7 +5238,7 @@
                 <a:ea typeface="+mn-ea"/>
                 <a:cs typeface="+mn-cs"/>
               </a:rPr>
-              <a:t>发送给</a:t>
+              <a:t>。要注意的是</a:t>
             </a:r>
             <a:r>
               <a:rPr lang="en-US" altLang="zh-CN" sz="1200" b="0" i="0" u="none" strike="noStrike" kern="1200" dirty="0">
@@ -5185,7 +5262,7 @@
                 <a:ea typeface="+mn-ea"/>
                 <a:cs typeface="+mn-cs"/>
               </a:rPr>
-              <a:t>，在</a:t>
+              <a:t>在内存中有一个数据的备份，因为</a:t>
             </a:r>
             <a:r>
               <a:rPr lang="en-US" altLang="zh-CN" sz="1200" b="0" i="0" u="none" strike="noStrike" kern="1200" dirty="0">
@@ -5209,7 +5286,7 @@
                 <a:ea typeface="+mn-ea"/>
                 <a:cs typeface="+mn-cs"/>
               </a:rPr>
-              <a:t>拿到所有</a:t>
+              <a:t>是从</a:t>
             </a:r>
             <a:r>
               <a:rPr lang="en-US" altLang="zh-CN" sz="1200" b="0" i="0" u="none" strike="noStrike" kern="1200" dirty="0">
@@ -5221,7 +5298,7 @@
                 <a:ea typeface="+mn-ea"/>
                 <a:cs typeface="+mn-cs"/>
               </a:rPr>
-              <a:t>message</a:t>
+              <a:t>backup</a:t>
             </a:r>
             <a:r>
               <a:rPr lang="zh-CN" altLang="en-US" sz="1200" b="0" i="0" u="none" strike="noStrike" kern="1200" dirty="0">
@@ -5233,7 +5310,7 @@
                 <a:ea typeface="+mn-ea"/>
                 <a:cs typeface="+mn-cs"/>
               </a:rPr>
-              <a:t>后，</a:t>
+              <a:t>晋升过来的。所以这些</a:t>
             </a:r>
             <a:r>
               <a:rPr lang="en-US" altLang="zh-CN" sz="1200" b="0" i="0" u="none" strike="noStrike" kern="1200" dirty="0">
@@ -5245,6 +5322,106 @@
                 <a:ea typeface="+mn-ea"/>
                 <a:cs typeface="+mn-cs"/>
               </a:rPr>
+              <a:t>region</a:t>
+            </a:r>
+            <a:r>
+              <a:rPr lang="zh-CN" altLang="en-US" sz="1200" b="0" i="0" u="none" strike="noStrike" kern="1200" dirty="0">
+                <a:solidFill>
+                  <a:schemeClr val="tx1"/>
+                </a:solidFill>
+                <a:effectLst/>
+                <a:latin typeface="+mn-lt"/>
+                <a:ea typeface="+mn-ea"/>
+                <a:cs typeface="+mn-cs"/>
+              </a:rPr>
+              <a:t>看起来应该和失效前是一致的。</a:t>
+            </a:r>
+          </a:p>
+          <a:p>
+            <a:r>
+              <a:rPr lang="zh-CN" altLang="en-US" sz="1200" b="0" i="0" u="none" strike="noStrike" kern="1200" dirty="0">
+                <a:solidFill>
+                  <a:schemeClr val="tx1"/>
+                </a:solidFill>
+                <a:effectLst/>
+                <a:latin typeface="+mn-lt"/>
+                <a:ea typeface="+mn-ea"/>
+                <a:cs typeface="+mn-cs"/>
+              </a:rPr>
+              <a:t>在确定了要恢复的事务后，之前受失败影响的</a:t>
+            </a:r>
+            <a:r>
+              <a:rPr lang="en-US" altLang="zh-CN" sz="1200" b="0" i="0" u="none" strike="noStrike" kern="1200" dirty="0">
+                <a:solidFill>
+                  <a:schemeClr val="tx1"/>
+                </a:solidFill>
+                <a:effectLst/>
+                <a:latin typeface="+mn-lt"/>
+                <a:ea typeface="+mn-ea"/>
+                <a:cs typeface="+mn-cs"/>
+              </a:rPr>
+              <a:t>region</a:t>
+            </a:r>
+            <a:r>
+              <a:rPr lang="zh-CN" altLang="en-US" sz="1200" b="0" i="0" u="none" strike="noStrike" kern="1200" dirty="0">
+                <a:solidFill>
+                  <a:schemeClr val="tx1"/>
+                </a:solidFill>
+                <a:effectLst/>
+                <a:latin typeface="+mn-lt"/>
+                <a:ea typeface="+mn-ea"/>
+                <a:cs typeface="+mn-cs"/>
+              </a:rPr>
+              <a:t>就可以被重新访问了。后续恢复步骤并行地读取对象并提交对</a:t>
+            </a:r>
+            <a:r>
+              <a:rPr lang="en-US" altLang="zh-CN" sz="1200" b="0" i="0" u="none" strike="noStrike" kern="1200" dirty="0">
+                <a:solidFill>
+                  <a:schemeClr val="tx1"/>
+                </a:solidFill>
+                <a:effectLst/>
+                <a:latin typeface="+mn-lt"/>
+                <a:ea typeface="+mn-ea"/>
+                <a:cs typeface="+mn-cs"/>
+              </a:rPr>
+              <a:t>region</a:t>
+            </a:r>
+            <a:r>
+              <a:rPr lang="zh-CN" altLang="en-US" sz="1200" b="0" i="0" u="none" strike="noStrike" kern="1200" dirty="0">
+                <a:solidFill>
+                  <a:schemeClr val="tx1"/>
+                </a:solidFill>
+                <a:effectLst/>
+                <a:latin typeface="+mn-lt"/>
+                <a:ea typeface="+mn-ea"/>
+                <a:cs typeface="+mn-cs"/>
+              </a:rPr>
+              <a:t>的更新，从而提升效率。</a:t>
+            </a:r>
+          </a:p>
+          <a:p>
+            <a:r>
+              <a:rPr lang="zh-CN" altLang="en-US" sz="1200" b="0" i="0" u="none" strike="noStrike" kern="1200" dirty="0">
+                <a:solidFill>
+                  <a:schemeClr val="tx1"/>
+                </a:solidFill>
+                <a:effectLst/>
+                <a:latin typeface="+mn-lt"/>
+                <a:ea typeface="+mn-ea"/>
+                <a:cs typeface="+mn-cs"/>
+              </a:rPr>
+              <a:t>下一步是复制</a:t>
+            </a:r>
+            <a:r>
+              <a:rPr lang="en-US" altLang="zh-CN" sz="1200" b="0" i="0" u="none" strike="noStrike" kern="1200" dirty="0">
+                <a:solidFill>
+                  <a:schemeClr val="tx1"/>
+                </a:solidFill>
+                <a:effectLst/>
+                <a:latin typeface="+mn-lt"/>
+                <a:ea typeface="+mn-ea"/>
+                <a:cs typeface="+mn-cs"/>
+              </a:rPr>
               <a:t>primary</a:t>
             </a:r>
             <a:r>
@@ -5257,7 +5434,7 @@
                 <a:ea typeface="+mn-ea"/>
                 <a:cs typeface="+mn-cs"/>
               </a:rPr>
-              <a:t>会重新去获取这些</a:t>
+              <a:t>上的</a:t>
             </a:r>
             <a:r>
               <a:rPr lang="en-US" altLang="zh-CN" sz="1200" b="0" i="0" u="none" strike="noStrike" kern="1200" dirty="0">
@@ -5269,6 +5446,54 @@
                 <a:ea typeface="+mn-ea"/>
                 <a:cs typeface="+mn-cs"/>
               </a:rPr>
+              <a:t>log</a:t>
+            </a:r>
+            <a:r>
+              <a:rPr lang="zh-CN" altLang="en-US" sz="1200" b="0" i="0" u="none" strike="noStrike" kern="1200" dirty="0">
+                <a:solidFill>
+                  <a:schemeClr val="tx1"/>
+                </a:solidFill>
+                <a:effectLst/>
+                <a:latin typeface="+mn-lt"/>
+                <a:ea typeface="+mn-ea"/>
+                <a:cs typeface="+mn-cs"/>
+              </a:rPr>
+              <a:t>，这是需要的，需要应对未来的失效。然后</a:t>
+            </a:r>
+            <a:r>
+              <a:rPr lang="en-US" altLang="zh-CN" sz="1200" b="0" i="0" u="none" strike="noStrike" kern="1200" dirty="0">
+                <a:solidFill>
+                  <a:schemeClr val="tx1"/>
+                </a:solidFill>
+                <a:effectLst/>
+                <a:latin typeface="+mn-lt"/>
+                <a:ea typeface="+mn-ea"/>
+                <a:cs typeface="+mn-cs"/>
+              </a:rPr>
+              <a:t>primary</a:t>
+            </a:r>
+            <a:r>
+              <a:rPr lang="zh-CN" altLang="en-US" sz="1200" b="0" i="0" u="none" strike="noStrike" kern="1200" dirty="0">
+                <a:solidFill>
+                  <a:schemeClr val="tx1"/>
+                </a:solidFill>
+                <a:effectLst/>
+                <a:latin typeface="+mn-lt"/>
+                <a:ea typeface="+mn-ea"/>
+                <a:cs typeface="+mn-cs"/>
+              </a:rPr>
+              <a:t>给协调器发送一个投票请求，每个</a:t>
+            </a:r>
+            <a:r>
+              <a:rPr lang="en-US" altLang="zh-CN" sz="1200" b="0" i="0" u="none" strike="noStrike" kern="1200" dirty="0">
+                <a:solidFill>
+                  <a:schemeClr val="tx1"/>
+                </a:solidFill>
+                <a:effectLst/>
+                <a:latin typeface="+mn-lt"/>
+                <a:ea typeface="+mn-ea"/>
+                <a:cs typeface="+mn-cs"/>
+              </a:rPr>
               <a:t>region</a:t>
             </a:r>
             <a:r>
@@ -5281,7 +5506,7 @@
                 <a:ea typeface="+mn-ea"/>
                 <a:cs typeface="+mn-cs"/>
               </a:rPr>
-              <a:t>的对应</a:t>
+              <a:t>根据事务更新去投票决定是提交还是中止事务，最后</a:t>
             </a:r>
             <a:r>
               <a:rPr lang="en-US" altLang="zh-CN" sz="1200" b="0" i="0" u="none" strike="noStrike" kern="1200" dirty="0">
@@ -5293,7 +5518,7 @@
                 <a:ea typeface="+mn-ea"/>
                 <a:cs typeface="+mn-cs"/>
               </a:rPr>
-              <a:t>log</a:t>
+              <a:t>coordinator</a:t>
             </a:r>
             <a:r>
               <a:rPr lang="zh-CN" altLang="en-US" sz="1200" b="0" i="0" u="none" strike="noStrike" kern="1200" dirty="0">
@@ -5305,7 +5530,21 @@
                 <a:ea typeface="+mn-ea"/>
                 <a:cs typeface="+mn-cs"/>
               </a:rPr>
-              <a:t>。要注意的是</a:t>
+              <a:t>决定最终结果。</a:t>
+            </a:r>
+          </a:p>
+          <a:p>
+            <a:r>
+              <a:rPr lang="zh-CN" altLang="en-US" sz="1200" b="0" i="0" u="none" strike="noStrike" kern="1200" dirty="0">
+                <a:solidFill>
+                  <a:schemeClr val="tx1"/>
+                </a:solidFill>
+                <a:effectLst/>
+                <a:latin typeface="+mn-lt"/>
+                <a:ea typeface="+mn-ea"/>
+                <a:cs typeface="+mn-cs"/>
+              </a:rPr>
+              <a:t>所以这就是事务的恢复，我知道它涉及很多步骤，而且还隐藏了一些细节，比如如何确定每个</a:t>
             </a:r>
             <a:r>
               <a:rPr lang="en-US" altLang="zh-CN" sz="1200" b="0" i="0" u="none" strike="noStrike" kern="1200" dirty="0">
@@ -5317,6 +5556,30 @@
                 <a:ea typeface="+mn-ea"/>
                 <a:cs typeface="+mn-cs"/>
               </a:rPr>
+              <a:t>region</a:t>
+            </a:r>
+            <a:r>
+              <a:rPr lang="zh-CN" altLang="en-US" sz="1200" b="0" i="0" u="none" strike="noStrike" kern="1200" dirty="0">
+                <a:solidFill>
+                  <a:schemeClr val="tx1"/>
+                </a:solidFill>
+                <a:effectLst/>
+                <a:latin typeface="+mn-lt"/>
+                <a:ea typeface="+mn-ea"/>
+                <a:cs typeface="+mn-cs"/>
+              </a:rPr>
+              <a:t>的投票。我们需要记住的是，上面这些步骤的直觉是恢复保留了先前已提交或中止的事务的结果。我们说只有</a:t>
+            </a:r>
+            <a:r>
+              <a:rPr lang="en-US" altLang="zh-CN" sz="1200" b="0" i="0" u="none" strike="noStrike" kern="1200" dirty="0">
+                <a:solidFill>
+                  <a:schemeClr val="tx1"/>
+                </a:solidFill>
+                <a:effectLst/>
+                <a:latin typeface="+mn-lt"/>
+                <a:ea typeface="+mn-ea"/>
+                <a:cs typeface="+mn-cs"/>
+              </a:rPr>
               <a:t>primary</a:t>
             </a:r>
             <a:r>
@@ -5329,7 +5592,7 @@
                 <a:ea typeface="+mn-ea"/>
                 <a:cs typeface="+mn-cs"/>
               </a:rPr>
-              <a:t>在内存中有一个数据的备份，因为</a:t>
+              <a:t>公开事务修改或</a:t>
             </a:r>
             <a:r>
               <a:rPr lang="en-US" altLang="zh-CN" sz="1200" b="0" i="0" u="none" strike="noStrike" kern="1200" dirty="0">
@@ -5341,7 +5604,7 @@
                 <a:ea typeface="+mn-ea"/>
                 <a:cs typeface="+mn-cs"/>
               </a:rPr>
-              <a:t>primary</a:t>
+              <a:t>coordinator</a:t>
             </a:r>
             <a:r>
               <a:rPr lang="zh-CN" altLang="en-US" sz="1200" b="0" i="0" u="none" strike="noStrike" kern="1200" dirty="0">
@@ -5353,7 +5616,7 @@
                 <a:ea typeface="+mn-ea"/>
                 <a:cs typeface="+mn-cs"/>
               </a:rPr>
-              <a:t>是从</a:t>
+              <a:t>通知应用程序提交事务时，事务被提交了。 当</a:t>
             </a:r>
             <a:r>
               <a:rPr lang="en-US" altLang="zh-CN" sz="1200" b="0" i="0" u="none" strike="noStrike" kern="1200" dirty="0">
@@ -5365,7 +5628,7 @@
                 <a:ea typeface="+mn-ea"/>
                 <a:cs typeface="+mn-cs"/>
               </a:rPr>
-              <a:t>backup</a:t>
+              <a:t>coordinator</a:t>
             </a:r>
             <a:r>
               <a:rPr lang="zh-CN" altLang="en-US" sz="1200" b="0" i="0" u="none" strike="noStrike" kern="1200" dirty="0">
@@ -5377,436 +5640,8 @@
                 <a:ea typeface="+mn-ea"/>
                 <a:cs typeface="+mn-cs"/>
               </a:rPr>
-              <a:t>晋升过来的。所以这些</a:t>
-            </a:r>
-            <a:r>
-              <a:rPr lang="en-US" altLang="zh-CN" sz="1200" b="0" i="0" u="none" strike="noStrike" kern="1200" dirty="0">
-                <a:solidFill>
-                  <a:schemeClr val="tx1"/>
-                </a:solidFill>
-                <a:effectLst/>
-                <a:latin typeface="+mn-lt"/>
-                <a:ea typeface="+mn-ea"/>
-                <a:cs typeface="+mn-cs"/>
-              </a:rPr>
-              <a:t>region</a:t>
-            </a:r>
-            <a:r>
-              <a:rPr lang="zh-CN" altLang="en-US" sz="1200" b="0" i="0" u="none" strike="noStrike" kern="1200" dirty="0">
-                <a:solidFill>
-                  <a:schemeClr val="tx1"/>
-                </a:solidFill>
-                <a:effectLst/>
-                <a:latin typeface="+mn-lt"/>
-                <a:ea typeface="+mn-ea"/>
-                <a:cs typeface="+mn-cs"/>
-              </a:rPr>
-              <a:t>看起来应该和失效前是一致的。</a:t>
-            </a:r>
-          </a:p>
-          <a:p>
-            <a:r>
-              <a:rPr lang="zh-CN" altLang="en-US" sz="1200" b="0" i="0" u="none" strike="noStrike" kern="1200" dirty="0">
-                <a:solidFill>
-                  <a:schemeClr val="tx1"/>
-                </a:solidFill>
-                <a:effectLst/>
-                <a:latin typeface="+mn-lt"/>
-                <a:ea typeface="+mn-ea"/>
-                <a:cs typeface="+mn-cs"/>
-              </a:rPr>
-              <a:t>在确定了要恢复的事务后，之前受失败影响的</a:t>
-            </a:r>
-            <a:r>
-              <a:rPr lang="en-US" altLang="zh-CN" sz="1200" b="0" i="0" u="none" strike="noStrike" kern="1200" dirty="0">
-                <a:solidFill>
-                  <a:schemeClr val="tx1"/>
-                </a:solidFill>
-                <a:effectLst/>
-                <a:latin typeface="+mn-lt"/>
-                <a:ea typeface="+mn-ea"/>
-                <a:cs typeface="+mn-cs"/>
-              </a:rPr>
-              <a:t>region</a:t>
-            </a:r>
-            <a:r>
-              <a:rPr lang="zh-CN" altLang="en-US" sz="1200" b="0" i="0" u="none" strike="noStrike" kern="1200" dirty="0">
-                <a:solidFill>
-                  <a:schemeClr val="tx1"/>
-                </a:solidFill>
-                <a:effectLst/>
-                <a:latin typeface="+mn-lt"/>
-                <a:ea typeface="+mn-ea"/>
-                <a:cs typeface="+mn-cs"/>
-              </a:rPr>
-              <a:t>就可以被重新访问了。后续恢复步骤并行地读取对象并提交对</a:t>
-            </a:r>
-            <a:r>
-              <a:rPr lang="en-US" altLang="zh-CN" sz="1200" b="0" i="0" u="none" strike="noStrike" kern="1200" dirty="0">
-                <a:solidFill>
-                  <a:schemeClr val="tx1"/>
-                </a:solidFill>
-                <a:effectLst/>
-                <a:latin typeface="+mn-lt"/>
-                <a:ea typeface="+mn-ea"/>
-                <a:cs typeface="+mn-cs"/>
-              </a:rPr>
-              <a:t>region</a:t>
-            </a:r>
-            <a:r>
-              <a:rPr lang="zh-CN" altLang="en-US" sz="1200" b="0" i="0" u="none" strike="noStrike" kern="1200" dirty="0">
-                <a:solidFill>
-                  <a:schemeClr val="tx1"/>
-                </a:solidFill>
-                <a:effectLst/>
-                <a:latin typeface="+mn-lt"/>
-                <a:ea typeface="+mn-ea"/>
-                <a:cs typeface="+mn-cs"/>
-              </a:rPr>
-              <a:t>的更新，从而提升效率。</a:t>
-            </a:r>
-          </a:p>
-          <a:p>
-            <a:r>
-              <a:rPr lang="zh-CN" altLang="en-US" sz="1200" b="0" i="0" u="none" strike="noStrike" kern="1200" dirty="0">
-                <a:solidFill>
-                  <a:schemeClr val="tx1"/>
-                </a:solidFill>
-                <a:effectLst/>
-                <a:latin typeface="+mn-lt"/>
-                <a:ea typeface="+mn-ea"/>
-                <a:cs typeface="+mn-cs"/>
-              </a:rPr>
-              <a:t>下一步是复制</a:t>
-            </a:r>
-            <a:r>
-              <a:rPr lang="en-US" altLang="zh-CN" sz="1200" b="0" i="0" u="none" strike="noStrike" kern="1200" dirty="0">
-                <a:solidFill>
-                  <a:schemeClr val="tx1"/>
-                </a:solidFill>
-                <a:effectLst/>
-                <a:latin typeface="+mn-lt"/>
-                <a:ea typeface="+mn-ea"/>
-                <a:cs typeface="+mn-cs"/>
-              </a:rPr>
-              <a:t>primary</a:t>
-            </a:r>
-            <a:r>
-              <a:rPr lang="zh-CN" altLang="en-US" sz="1200" b="0" i="0" u="none" strike="noStrike" kern="1200" dirty="0">
-                <a:solidFill>
-                  <a:schemeClr val="tx1"/>
-                </a:solidFill>
-                <a:effectLst/>
-                <a:latin typeface="+mn-lt"/>
-                <a:ea typeface="+mn-ea"/>
-                <a:cs typeface="+mn-cs"/>
-              </a:rPr>
-              <a:t>上的</a:t>
-            </a:r>
-            <a:r>
-              <a:rPr lang="en-US" altLang="zh-CN" sz="1200" b="0" i="0" u="none" strike="noStrike" kern="1200" dirty="0">
-                <a:solidFill>
-                  <a:schemeClr val="tx1"/>
-                </a:solidFill>
-                <a:effectLst/>
-                <a:latin typeface="+mn-lt"/>
-                <a:ea typeface="+mn-ea"/>
-                <a:cs typeface="+mn-cs"/>
-              </a:rPr>
-              <a:t>log</a:t>
-            </a:r>
-            <a:r>
-              <a:rPr lang="zh-CN" altLang="en-US" sz="1200" b="0" i="0" u="none" strike="noStrike" kern="1200" dirty="0">
-                <a:solidFill>
-                  <a:schemeClr val="tx1"/>
-                </a:solidFill>
-                <a:effectLst/>
-                <a:latin typeface="+mn-lt"/>
-                <a:ea typeface="+mn-ea"/>
-                <a:cs typeface="+mn-cs"/>
-              </a:rPr>
-              <a:t>，这是需要的，需要应对未来的失效。然后</a:t>
-            </a:r>
-            <a:r>
-              <a:rPr lang="en-US" altLang="zh-CN" sz="1200" b="0" i="0" u="none" strike="noStrike" kern="1200" dirty="0">
-                <a:solidFill>
-                  <a:schemeClr val="tx1"/>
-                </a:solidFill>
-                <a:effectLst/>
-                <a:latin typeface="+mn-lt"/>
-                <a:ea typeface="+mn-ea"/>
-                <a:cs typeface="+mn-cs"/>
-              </a:rPr>
-              <a:t>primary</a:t>
-            </a:r>
-            <a:r>
-              <a:rPr lang="zh-CN" altLang="en-US" sz="1200" b="0" i="0" u="none" strike="noStrike" kern="1200" dirty="0">
-                <a:solidFill>
-                  <a:schemeClr val="tx1"/>
-                </a:solidFill>
-                <a:effectLst/>
-                <a:latin typeface="+mn-lt"/>
-                <a:ea typeface="+mn-ea"/>
-                <a:cs typeface="+mn-cs"/>
-              </a:rPr>
-              <a:t>给协调器发送一个投票请求，每个</a:t>
-            </a:r>
-            <a:r>
-              <a:rPr lang="en-US" altLang="zh-CN" sz="1200" b="0" i="0" u="none" strike="noStrike" kern="1200" dirty="0">
-                <a:solidFill>
-                  <a:schemeClr val="tx1"/>
-                </a:solidFill>
-                <a:effectLst/>
-                <a:latin typeface="+mn-lt"/>
-                <a:ea typeface="+mn-ea"/>
-                <a:cs typeface="+mn-cs"/>
-              </a:rPr>
-              <a:t>region</a:t>
-            </a:r>
-            <a:r>
-              <a:rPr lang="zh-CN" altLang="en-US" sz="1200" b="0" i="0" u="none" strike="noStrike" kern="1200" dirty="0">
-                <a:solidFill>
-                  <a:schemeClr val="tx1"/>
-                </a:solidFill>
-                <a:effectLst/>
-                <a:latin typeface="+mn-lt"/>
-                <a:ea typeface="+mn-ea"/>
-                <a:cs typeface="+mn-cs"/>
-              </a:rPr>
-              <a:t>根据事务更新去投票决定是提交还是中止事务，最后</a:t>
-            </a:r>
-            <a:r>
-              <a:rPr lang="en-US" altLang="zh-CN" sz="1200" b="0" i="0" u="none" strike="noStrike" kern="1200" dirty="0">
-                <a:solidFill>
-                  <a:schemeClr val="tx1"/>
-                </a:solidFill>
-                <a:effectLst/>
-                <a:latin typeface="+mn-lt"/>
-                <a:ea typeface="+mn-ea"/>
-                <a:cs typeface="+mn-cs"/>
-              </a:rPr>
-              <a:t>coordinator</a:t>
-            </a:r>
-            <a:r>
-              <a:rPr lang="zh-CN" altLang="en-US" sz="1200" b="0" i="0" u="none" strike="noStrike" kern="1200" dirty="0">
-                <a:solidFill>
-                  <a:schemeClr val="tx1"/>
-                </a:solidFill>
-                <a:effectLst/>
-                <a:latin typeface="+mn-lt"/>
-                <a:ea typeface="+mn-ea"/>
-                <a:cs typeface="+mn-cs"/>
-              </a:rPr>
-              <a:t>决定最终结果。</a:t>
-            </a:r>
-          </a:p>
-          <a:p>
-            <a:r>
-              <a:rPr lang="zh-CN" altLang="en-US" sz="1200" b="0" i="0" u="none" strike="noStrike" kern="1200" dirty="0">
-                <a:solidFill>
-                  <a:schemeClr val="tx1"/>
-                </a:solidFill>
-                <a:effectLst/>
-                <a:latin typeface="+mn-lt"/>
-                <a:ea typeface="+mn-ea"/>
-                <a:cs typeface="+mn-cs"/>
-              </a:rPr>
-              <a:t>所以这就是事务的恢复，我知道它涉及很多步骤，而且还隐藏了一些细节，比如如何确定每个</a:t>
-            </a:r>
-            <a:r>
-              <a:rPr lang="en-US" altLang="zh-CN" sz="1200" b="0" i="0" u="none" strike="noStrike" kern="1200" dirty="0">
-                <a:solidFill>
-                  <a:schemeClr val="tx1"/>
-                </a:solidFill>
-                <a:effectLst/>
-                <a:latin typeface="+mn-lt"/>
-                <a:ea typeface="+mn-ea"/>
-                <a:cs typeface="+mn-cs"/>
-              </a:rPr>
-              <a:t>region</a:t>
-            </a:r>
-            <a:r>
-              <a:rPr lang="zh-CN" altLang="en-US" sz="1200" b="0" i="0" u="none" strike="noStrike" kern="1200" dirty="0">
-                <a:solidFill>
-                  <a:schemeClr val="tx1"/>
-                </a:solidFill>
-                <a:effectLst/>
-                <a:latin typeface="+mn-lt"/>
-                <a:ea typeface="+mn-ea"/>
-                <a:cs typeface="+mn-cs"/>
-              </a:rPr>
-              <a:t>的投票。我们需要记住的是，上面这些步骤的直觉是恢复保留了先前已提交或中止的事务的结果。我们说只有</a:t>
-            </a:r>
-            <a:r>
-              <a:rPr lang="en-US" altLang="zh-CN" sz="1200" b="0" i="0" u="none" strike="noStrike" kern="1200" dirty="0">
-                <a:solidFill>
-                  <a:schemeClr val="tx1"/>
-                </a:solidFill>
-                <a:effectLst/>
-                <a:latin typeface="+mn-lt"/>
-                <a:ea typeface="+mn-ea"/>
-                <a:cs typeface="+mn-cs"/>
-              </a:rPr>
-              <a:t>primary</a:t>
-            </a:r>
-            <a:r>
-              <a:rPr lang="zh-CN" altLang="en-US" sz="1200" b="0" i="0" u="none" strike="noStrike" kern="1200" dirty="0">
-                <a:solidFill>
-                  <a:schemeClr val="tx1"/>
-                </a:solidFill>
-                <a:effectLst/>
-                <a:latin typeface="+mn-lt"/>
-                <a:ea typeface="+mn-ea"/>
-                <a:cs typeface="+mn-cs"/>
-              </a:rPr>
-              <a:t>公开事务修改或</a:t>
-            </a:r>
-            <a:r>
-              <a:rPr lang="en-US" altLang="zh-CN" sz="1200" b="0" i="0" u="none" strike="noStrike" kern="1200" dirty="0">
-                <a:solidFill>
-                  <a:schemeClr val="tx1"/>
-                </a:solidFill>
-                <a:effectLst/>
-                <a:latin typeface="+mn-lt"/>
-                <a:ea typeface="+mn-ea"/>
-                <a:cs typeface="+mn-cs"/>
-              </a:rPr>
-              <a:t>coordinator</a:t>
-            </a:r>
-            <a:r>
-              <a:rPr lang="zh-CN" altLang="en-US" sz="1200" b="0" i="0" u="none" strike="noStrike" kern="1200" dirty="0">
-                <a:solidFill>
-                  <a:schemeClr val="tx1"/>
-                </a:solidFill>
-                <a:effectLst/>
-                <a:latin typeface="+mn-lt"/>
-                <a:ea typeface="+mn-ea"/>
-                <a:cs typeface="+mn-cs"/>
-              </a:rPr>
-              <a:t>通知应用程序提交事务时，事务被提交了。 当</a:t>
-            </a:r>
-            <a:r>
-              <a:rPr lang="en-US" altLang="zh-CN" sz="1200" b="0" i="0" u="none" strike="noStrike" kern="1200" dirty="0">
-                <a:solidFill>
-                  <a:schemeClr val="tx1"/>
-                </a:solidFill>
-                <a:effectLst/>
-                <a:latin typeface="+mn-lt"/>
-                <a:ea typeface="+mn-ea"/>
-                <a:cs typeface="+mn-cs"/>
-              </a:rPr>
-              <a:t>coordinator</a:t>
-            </a:r>
-            <a:r>
-              <a:rPr lang="zh-CN" altLang="en-US" sz="1200" b="0" i="0" u="none" strike="noStrike" kern="1200" dirty="0">
-                <a:solidFill>
-                  <a:schemeClr val="tx1"/>
-                </a:solidFill>
-                <a:effectLst/>
-                <a:latin typeface="+mn-lt"/>
-                <a:ea typeface="+mn-ea"/>
-                <a:cs typeface="+mn-cs"/>
-              </a:rPr>
-              <a:t>发送中止消息或通知应用程序事务已中止时，事务将中止。 对于尚未确定结果的交易，恢复可能会提交或中止，但它确保从其他故障中恢复可以保留之前结果。另外一点是，</a:t>
-            </a:r>
-            <a:r>
-              <a:rPr lang="en-US" altLang="zh-CN" sz="1200" b="0" i="0" u="none" strike="noStrike" kern="1200" dirty="0">
-                <a:solidFill>
-                  <a:schemeClr val="tx1"/>
-                </a:solidFill>
-                <a:effectLst/>
-                <a:latin typeface="+mn-lt"/>
-                <a:ea typeface="+mn-ea"/>
-                <a:cs typeface="+mn-cs"/>
-              </a:rPr>
-              <a:t>FaRM</a:t>
-            </a:r>
-            <a:r>
-              <a:rPr lang="zh-CN" altLang="en-US" sz="1200" b="0" i="0" u="none" strike="noStrike" kern="1200" dirty="0">
-                <a:solidFill>
-                  <a:schemeClr val="tx1"/>
-                </a:solidFill>
-                <a:effectLst/>
-                <a:latin typeface="+mn-lt"/>
-                <a:ea typeface="+mn-ea"/>
-                <a:cs typeface="+mn-cs"/>
-              </a:rPr>
-              <a:t>通过</a:t>
-            </a:r>
-            <a:r>
-              <a:rPr lang="en-US" altLang="zh-CN" sz="1200" b="0" i="0" u="none" strike="noStrike" kern="1200" dirty="0">
-                <a:solidFill>
-                  <a:schemeClr val="tx1"/>
-                </a:solidFill>
-                <a:effectLst/>
-                <a:latin typeface="+mn-lt"/>
-                <a:ea typeface="+mn-ea"/>
-                <a:cs typeface="+mn-cs"/>
-              </a:rPr>
-              <a:t>backup</a:t>
-            </a:r>
-            <a:r>
-              <a:rPr lang="zh-CN" altLang="en-US" sz="1200" b="0" i="0" u="none" strike="noStrike" kern="1200" dirty="0">
-                <a:solidFill>
-                  <a:schemeClr val="tx1"/>
-                </a:solidFill>
-                <a:effectLst/>
-                <a:latin typeface="+mn-lt"/>
-                <a:ea typeface="+mn-ea"/>
-                <a:cs typeface="+mn-cs"/>
-              </a:rPr>
-              <a:t>晋升为</a:t>
-            </a:r>
-            <a:r>
-              <a:rPr lang="en-US" altLang="zh-CN" sz="1200" b="0" i="0" u="none" strike="noStrike" kern="1200" dirty="0">
-                <a:solidFill>
-                  <a:schemeClr val="tx1"/>
-                </a:solidFill>
-                <a:effectLst/>
-                <a:latin typeface="+mn-lt"/>
-                <a:ea typeface="+mn-ea"/>
-                <a:cs typeface="+mn-cs"/>
-              </a:rPr>
-              <a:t>primary</a:t>
-            </a:r>
-            <a:r>
-              <a:rPr lang="zh-CN" altLang="en-US" sz="1200" b="0" i="0" u="none" strike="noStrike" kern="1200" dirty="0">
-                <a:solidFill>
-                  <a:schemeClr val="tx1"/>
-                </a:solidFill>
-                <a:effectLst/>
-                <a:latin typeface="+mn-lt"/>
-                <a:ea typeface="+mn-ea"/>
-                <a:cs typeface="+mn-cs"/>
-              </a:rPr>
-              <a:t>机制，确定恢复事务后相关</a:t>
-            </a:r>
-            <a:r>
-              <a:rPr lang="en-US" altLang="zh-CN" sz="1200" b="0" i="0" u="none" strike="noStrike" kern="1200" dirty="0">
-                <a:solidFill>
-                  <a:schemeClr val="tx1"/>
-                </a:solidFill>
-                <a:effectLst/>
-                <a:latin typeface="+mn-lt"/>
-                <a:ea typeface="+mn-ea"/>
-                <a:cs typeface="+mn-cs"/>
-              </a:rPr>
-              <a:t>region</a:t>
-            </a:r>
-            <a:r>
-              <a:rPr lang="zh-CN" altLang="en-US" sz="1200" b="0" i="0" u="none" strike="noStrike" kern="1200" dirty="0">
-                <a:solidFill>
-                  <a:schemeClr val="tx1"/>
-                </a:solidFill>
-                <a:effectLst/>
-                <a:latin typeface="+mn-lt"/>
-                <a:ea typeface="+mn-ea"/>
-                <a:cs typeface="+mn-cs"/>
-              </a:rPr>
-              <a:t>可以被重新访问以及大量的并行操作去尽可能的减少系统的停机时间。</a:t>
-            </a:r>
-          </a:p>
-          <a:p>
+              <a:t>发送中止消息或通知应用程序事务已中止时，事务将中止。 对于尚未确定结果的交易，恢复可能会提交或中止，但可以确保保留之前提交的结果。</a:t>
+            </a:r>
             <a:endParaRPr kumimoji="1" lang="zh-CN" altLang="en-US" dirty="0"/>
           </a:p>
         </p:txBody>
@@ -6847,7 +6682,7 @@
                 <a:ea typeface="+mn-ea"/>
                 <a:cs typeface="+mn-cs"/>
               </a:rPr>
-              <a:t>，现在假设已经有了使用这些硬件的系统，它当然能比没有这些硬件条件下性能更好，但是为了完全利用这些硬件，需要设计一个新的协议，这个协议是为我刚刚之前讲的那些</a:t>
+              <a:t>，为了充分利用这些硬件，需要设计一个新的协议，这个协议就是为我刚刚那些硬件量身定做的。因此，这篇论文的主要工作是</a:t>
             </a:r>
             <a:r>
               <a:rPr lang="en-US" altLang="zh-CN" sz="1200" b="0" i="0" u="none" strike="noStrike" kern="1200" dirty="0">
@@ -6859,7 +6694,7 @@
                 <a:ea typeface="+mn-ea"/>
                 <a:cs typeface="+mn-cs"/>
               </a:rPr>
-              <a:t>hardware trends</a:t>
+              <a:t>"design transaction and recovery protocols"</a:t>
             </a:r>
             <a:r>
               <a:rPr lang="zh-CN" altLang="en-US" sz="1200" b="0" i="0" u="none" strike="noStrike" kern="1200" dirty="0">
@@ -6871,7 +6706,7 @@
                 <a:ea typeface="+mn-ea"/>
                 <a:cs typeface="+mn-cs"/>
               </a:rPr>
-              <a:t>量身定做的。因此，这篇论文的主要工作是</a:t>
+              <a:t>，那之前说了，在这种硬件条件下，</a:t>
             </a:r>
             <a:r>
               <a:rPr lang="en-US" altLang="zh-CN" sz="1200" b="0" i="0" u="none" strike="noStrike" kern="1200" dirty="0">
@@ -6883,7 +6718,7 @@
                 <a:ea typeface="+mn-ea"/>
                 <a:cs typeface="+mn-cs"/>
               </a:rPr>
-              <a:t>"design transaction and recovery protocols"</a:t>
+              <a:t>CPU</a:t>
             </a:r>
             <a:r>
               <a:rPr lang="zh-CN" altLang="en-US" sz="1200" b="0" i="0" u="none" strike="noStrike" kern="1200" dirty="0">
@@ -6895,7 +6730,7 @@
                 <a:ea typeface="+mn-ea"/>
                 <a:cs typeface="+mn-cs"/>
               </a:rPr>
-              <a:t>，那之前说了，在这种硬件条件下，</a:t>
+              <a:t>会成为瓶颈，因此在设计这个协议的同时，论文需要遵循以下三个</a:t>
             </a:r>
             <a:r>
               <a:rPr lang="en-US" altLang="zh-CN" sz="1200" b="0" i="0" u="none" strike="noStrike" kern="1200" dirty="0">
@@ -6907,203 +6742,95 @@
                 <a:ea typeface="+mn-ea"/>
                 <a:cs typeface="+mn-cs"/>
               </a:rPr>
+              <a:t>principle</a:t>
+            </a:r>
+            <a:r>
+              <a:rPr lang="zh-CN" altLang="en-US" sz="1200" b="0" i="0" u="none" strike="noStrike" kern="1200" dirty="0">
+                <a:solidFill>
+                  <a:schemeClr val="tx1"/>
+                </a:solidFill>
+                <a:effectLst/>
+                <a:latin typeface="+mn-lt"/>
+                <a:ea typeface="+mn-ea"/>
+                <a:cs typeface="+mn-cs"/>
+              </a:rPr>
+              <a:t>：</a:t>
+            </a:r>
+          </a:p>
+          <a:p>
+            <a:r>
+              <a:rPr lang="zh-CN" altLang="en-US" sz="1200" b="0" i="0" u="none" strike="noStrike" kern="1200" dirty="0">
+                <a:solidFill>
+                  <a:schemeClr val="tx1"/>
+                </a:solidFill>
+                <a:effectLst/>
+                <a:latin typeface="+mn-lt"/>
+                <a:ea typeface="+mn-ea"/>
+                <a:cs typeface="+mn-cs"/>
+              </a:rPr>
+              <a:t>使用单边的</a:t>
+            </a:r>
+            <a:r>
+              <a:rPr lang="en-US" altLang="zh-CN" sz="1200" b="0" i="0" u="none" strike="noStrike" kern="1200" dirty="0">
+                <a:solidFill>
+                  <a:schemeClr val="tx1"/>
+                </a:solidFill>
+                <a:effectLst/>
+                <a:latin typeface="+mn-lt"/>
+                <a:ea typeface="+mn-ea"/>
+                <a:cs typeface="+mn-cs"/>
+              </a:rPr>
+              <a:t>RDMA</a:t>
+            </a:r>
+            <a:r>
+              <a:rPr lang="zh-CN" altLang="en-US" sz="1200" b="0" i="0" u="none" strike="noStrike" kern="1200" dirty="0">
+                <a:solidFill>
+                  <a:schemeClr val="tx1"/>
+                </a:solidFill>
+                <a:effectLst/>
+                <a:latin typeface="+mn-lt"/>
+                <a:ea typeface="+mn-ea"/>
+                <a:cs typeface="+mn-cs"/>
+              </a:rPr>
+              <a:t>操作，因为它不仅提供了高吞吐量，低延迟，还做到了</a:t>
+            </a:r>
+            <a:r>
+              <a:rPr lang="en-US" altLang="zh-CN" sz="1200" b="0" i="0" u="none" strike="noStrike" kern="1200" dirty="0">
+                <a:solidFill>
+                  <a:schemeClr val="tx1"/>
+                </a:solidFill>
+                <a:effectLst/>
+                <a:latin typeface="+mn-lt"/>
+                <a:ea typeface="+mn-ea"/>
+                <a:cs typeface="+mn-cs"/>
+              </a:rPr>
+              <a:t>CPU efficient</a:t>
+            </a:r>
+          </a:p>
+          <a:p>
+            <a:r>
+              <a:rPr lang="zh-CN" altLang="en-US" sz="1200" b="0" i="0" u="none" strike="noStrike" kern="1200" dirty="0">
+                <a:solidFill>
+                  <a:schemeClr val="tx1"/>
+                </a:solidFill>
+                <a:effectLst/>
+                <a:latin typeface="+mn-lt"/>
+                <a:ea typeface="+mn-ea"/>
+                <a:cs typeface="+mn-cs"/>
+              </a:rPr>
+              <a:t>第二个准则是在我们的协议中减少消息数量，因为处理消息需要占用</a:t>
+            </a:r>
+            <a:r>
+              <a:rPr lang="en-US" altLang="zh-CN" sz="1200" b="0" i="0" u="none" strike="noStrike" kern="1200" dirty="0">
+                <a:solidFill>
+                  <a:schemeClr val="tx1"/>
+                </a:solidFill>
+                <a:effectLst/>
+                <a:latin typeface="+mn-lt"/>
+                <a:ea typeface="+mn-ea"/>
+                <a:cs typeface="+mn-cs"/>
+              </a:rPr>
               <a:t>CPU</a:t>
-            </a:r>
-            <a:r>
-              <a:rPr lang="zh-CN" altLang="en-US" sz="1200" b="0" i="0" u="none" strike="noStrike" kern="1200" dirty="0">
-                <a:solidFill>
-                  <a:schemeClr val="tx1"/>
-                </a:solidFill>
-                <a:effectLst/>
-                <a:latin typeface="+mn-lt"/>
-                <a:ea typeface="+mn-ea"/>
-                <a:cs typeface="+mn-cs"/>
-              </a:rPr>
-              <a:t>会成为瓶颈，因此在设计这个协议的同时，论文需要遵循以下三个</a:t>
-            </a:r>
-            <a:r>
-              <a:rPr lang="en-US" altLang="zh-CN" sz="1200" b="0" i="0" u="none" strike="noStrike" kern="1200" dirty="0">
-                <a:solidFill>
-                  <a:schemeClr val="tx1"/>
-                </a:solidFill>
-                <a:effectLst/>
-                <a:latin typeface="+mn-lt"/>
-                <a:ea typeface="+mn-ea"/>
-                <a:cs typeface="+mn-cs"/>
-              </a:rPr>
-              <a:t>principle</a:t>
-            </a:r>
-            <a:r>
-              <a:rPr lang="zh-CN" altLang="en-US" sz="1200" b="0" i="0" u="none" strike="noStrike" kern="1200" dirty="0">
-                <a:solidFill>
-                  <a:schemeClr val="tx1"/>
-                </a:solidFill>
-                <a:effectLst/>
-                <a:latin typeface="+mn-lt"/>
-                <a:ea typeface="+mn-ea"/>
-                <a:cs typeface="+mn-cs"/>
-              </a:rPr>
-              <a:t>：</a:t>
-            </a:r>
-          </a:p>
-          <a:p>
-            <a:r>
-              <a:rPr lang="zh-CN" altLang="en-US" sz="1200" b="0" i="0" u="none" strike="noStrike" kern="1200" dirty="0">
-                <a:solidFill>
-                  <a:schemeClr val="tx1"/>
-                </a:solidFill>
-                <a:effectLst/>
-                <a:latin typeface="+mn-lt"/>
-                <a:ea typeface="+mn-ea"/>
-                <a:cs typeface="+mn-cs"/>
-              </a:rPr>
-              <a:t>使用单边的</a:t>
-            </a:r>
-            <a:r>
-              <a:rPr lang="en-US" altLang="zh-CN" sz="1200" b="0" i="0" u="none" strike="noStrike" kern="1200" dirty="0">
-                <a:solidFill>
-                  <a:schemeClr val="tx1"/>
-                </a:solidFill>
-                <a:effectLst/>
-                <a:latin typeface="+mn-lt"/>
-                <a:ea typeface="+mn-ea"/>
-                <a:cs typeface="+mn-cs"/>
-              </a:rPr>
-              <a:t>RDMA</a:t>
-            </a:r>
-            <a:r>
-              <a:rPr lang="zh-CN" altLang="en-US" sz="1200" b="0" i="0" u="none" strike="noStrike" kern="1200" dirty="0">
-                <a:solidFill>
-                  <a:schemeClr val="tx1"/>
-                </a:solidFill>
-                <a:effectLst/>
-                <a:latin typeface="+mn-lt"/>
-                <a:ea typeface="+mn-ea"/>
-                <a:cs typeface="+mn-cs"/>
-              </a:rPr>
-              <a:t>操作，因为它不仅提供了高吞吐量，低延迟，还做到了</a:t>
-            </a:r>
-            <a:r>
-              <a:rPr lang="en-US" altLang="zh-CN" sz="1200" b="0" i="0" u="none" strike="noStrike" kern="1200" dirty="0">
-                <a:solidFill>
-                  <a:schemeClr val="tx1"/>
-                </a:solidFill>
-                <a:effectLst/>
-                <a:latin typeface="+mn-lt"/>
-                <a:ea typeface="+mn-ea"/>
-                <a:cs typeface="+mn-cs"/>
-              </a:rPr>
-              <a:t>CPU efficient</a:t>
-            </a:r>
-          </a:p>
-          <a:p>
-            <a:r>
-              <a:rPr lang="zh-CN" altLang="en-US" sz="1200" b="0" i="0" u="none" strike="noStrike" kern="1200" dirty="0">
-                <a:solidFill>
-                  <a:schemeClr val="tx1"/>
-                </a:solidFill>
-                <a:effectLst/>
-                <a:latin typeface="+mn-lt"/>
-                <a:ea typeface="+mn-ea"/>
-                <a:cs typeface="+mn-cs"/>
-              </a:rPr>
-              <a:t>第二个准则是在我们的协议中减少消息数量，因为处理消息需要占用</a:t>
-            </a:r>
-            <a:r>
-              <a:rPr lang="en-US" altLang="zh-CN" sz="1200" b="0" i="0" u="none" strike="noStrike" kern="1200" dirty="0">
-                <a:solidFill>
-                  <a:schemeClr val="tx1"/>
-                </a:solidFill>
-                <a:effectLst/>
-                <a:latin typeface="+mn-lt"/>
-                <a:ea typeface="+mn-ea"/>
-                <a:cs typeface="+mn-cs"/>
-              </a:rPr>
-              <a:t>CPU</a:t>
-            </a:r>
-            <a:r>
-              <a:rPr lang="zh-CN" altLang="en-US" sz="1200" b="0" i="0" u="none" strike="noStrike" kern="1200" dirty="0">
-                <a:solidFill>
-                  <a:schemeClr val="tx1"/>
-                </a:solidFill>
-                <a:effectLst/>
-                <a:latin typeface="+mn-lt"/>
-                <a:ea typeface="+mn-ea"/>
-                <a:cs typeface="+mn-cs"/>
-              </a:rPr>
-              <a:t>，比如论文中设计了一个</a:t>
-            </a:r>
-            <a:r>
-              <a:rPr lang="en-US" altLang="zh-CN" sz="1200" b="0" i="0" u="none" strike="noStrike" kern="1200" dirty="0">
-                <a:solidFill>
-                  <a:schemeClr val="tx1"/>
-                </a:solidFill>
-                <a:effectLst/>
-                <a:latin typeface="+mn-lt"/>
-                <a:ea typeface="+mn-ea"/>
-                <a:cs typeface="+mn-cs"/>
-              </a:rPr>
-              <a:t>4PC</a:t>
-            </a:r>
-            <a:r>
-              <a:rPr lang="zh-CN" altLang="en-US" sz="1200" b="0" i="0" u="none" strike="noStrike" kern="1200" dirty="0">
-                <a:solidFill>
-                  <a:schemeClr val="tx1"/>
-                </a:solidFill>
-                <a:effectLst/>
-                <a:latin typeface="+mn-lt"/>
-                <a:ea typeface="+mn-ea"/>
-                <a:cs typeface="+mn-cs"/>
-              </a:rPr>
-              <a:t>的事务设计而不是传统的</a:t>
-            </a:r>
-            <a:r>
-              <a:rPr lang="en-US" altLang="zh-CN" sz="1200" b="0" i="0" u="none" strike="noStrike" kern="1200" dirty="0">
-                <a:solidFill>
-                  <a:schemeClr val="tx1"/>
-                </a:solidFill>
-                <a:effectLst/>
-                <a:latin typeface="+mn-lt"/>
-                <a:ea typeface="+mn-ea"/>
-                <a:cs typeface="+mn-cs"/>
-              </a:rPr>
-              <a:t>2PC</a:t>
-            </a:r>
-            <a:r>
-              <a:rPr lang="zh-CN" altLang="en-US" sz="1200" b="0" i="0" u="none" strike="noStrike" kern="1200" dirty="0">
-                <a:solidFill>
-                  <a:schemeClr val="tx1"/>
-                </a:solidFill>
-                <a:effectLst/>
-                <a:latin typeface="+mn-lt"/>
-                <a:ea typeface="+mn-ea"/>
-                <a:cs typeface="+mn-cs"/>
-              </a:rPr>
-              <a:t>，因为它更加</a:t>
-            </a:r>
-            <a:r>
-              <a:rPr lang="en-US" altLang="zh-CN" sz="1200" b="0" i="0" u="none" strike="noStrike" kern="1200" dirty="0">
-                <a:solidFill>
-                  <a:schemeClr val="tx1"/>
-                </a:solidFill>
-                <a:effectLst/>
-                <a:latin typeface="+mn-lt"/>
-                <a:ea typeface="+mn-ea"/>
-                <a:cs typeface="+mn-cs"/>
-              </a:rPr>
-              <a:t>CPU efficient</a:t>
-            </a:r>
-            <a:r>
-              <a:rPr lang="zh-CN" altLang="en-US" sz="1200" b="0" i="0" u="none" strike="noStrike" kern="1200" dirty="0">
-                <a:solidFill>
-                  <a:schemeClr val="tx1"/>
-                </a:solidFill>
-                <a:effectLst/>
-                <a:latin typeface="+mn-lt"/>
-                <a:ea typeface="+mn-ea"/>
-                <a:cs typeface="+mn-cs"/>
-              </a:rPr>
-              <a:t>，这个会在之后再详细解释</a:t>
             </a:r>
           </a:p>
           <a:p>
@@ -7242,7 +6969,7 @@
                 <a:ea typeface="+mn-ea"/>
                 <a:cs typeface="+mn-cs"/>
               </a:rPr>
-              <a:t>那接下来我就要介绍论文如果利用上面这三个准则去构建一个高效的事务和恢复协议</a:t>
+              <a:t>那接下来我就要介绍论文如何利用上面这三个准则去构建一个高效的事务和恢复协议</a:t>
             </a:r>
             <a:endParaRPr kumimoji="1" lang="zh-CN" altLang="en-US" dirty="0"/>
           </a:p>
@@ -7386,7 +7113,7 @@
                 <a:ea typeface="+mn-ea"/>
                 <a:cs typeface="+mn-cs"/>
               </a:rPr>
-              <a:t>有一个一个集群，它把所有数据都存储在内存中，</a:t>
+              <a:t>有一个集群，它把所有数据都存储在内存中，</a:t>
             </a:r>
             <a:r>
               <a:rPr lang="en-US" altLang="zh-CN" sz="1200" b="0" i="0" u="none" strike="noStrike" kern="1200" dirty="0">
@@ -7542,7 +7269,7 @@
                 <a:ea typeface="+mn-ea"/>
                 <a:cs typeface="+mn-cs"/>
               </a:rPr>
-              <a:t>中的每个机器都会把它大部分内存贡献给共享内存，因为每台机器会把数据存在内存中，每个数据块大小是</a:t>
+              <a:t>中的每个机器都会把它大部分内存贡献给共享内存，数据都是存在内存中的，每个数据块大小是</a:t>
             </a:r>
             <a:r>
               <a:rPr lang="en-US" altLang="zh-CN" sz="1200" b="0" i="0" u="none" strike="noStrike" kern="1200" dirty="0">
@@ -8322,19 +8049,19 @@
                 <a:ea typeface="+mn-ea"/>
                 <a:cs typeface="+mn-cs"/>
               </a:rPr>
-              <a:t>就会拉取这些数据，但是一旦</a:t>
-            </a:r>
-            <a:r>
-              <a:rPr lang="en-US" altLang="zh-CN" sz="1200" b="0" i="0" u="none" strike="noStrike" kern="1200" dirty="0">
-                <a:solidFill>
-                  <a:schemeClr val="tx1"/>
-                </a:solidFill>
-                <a:effectLst/>
-                <a:latin typeface="+mn-lt"/>
-                <a:ea typeface="+mn-ea"/>
-                <a:cs typeface="+mn-cs"/>
-              </a:rPr>
-              <a:t>sender</a:t>
+              <a:t>就会拉取这些数据，但是对于</a:t>
+            </a:r>
+            <a:r>
+              <a:rPr lang="en-US" altLang="zh-CN" sz="1200" b="0" i="0" u="none" strike="noStrike" kern="1200" dirty="0" err="1">
+                <a:solidFill>
+                  <a:schemeClr val="tx1"/>
+                </a:solidFill>
+                <a:effectLst/>
+                <a:latin typeface="+mn-lt"/>
+                <a:ea typeface="+mn-ea"/>
+                <a:cs typeface="+mn-cs"/>
+              </a:rPr>
+              <a:t>nic</a:t>
             </a:r>
             <a:r>
               <a:rPr lang="zh-CN" altLang="en-US" sz="1200" b="0" i="0" u="none" strike="noStrike" kern="1200" dirty="0">
@@ -8346,7 +8073,7 @@
                 <a:ea typeface="+mn-ea"/>
                 <a:cs typeface="+mn-cs"/>
               </a:rPr>
-              <a:t>知道这些数据存入远程机器后，可能</a:t>
+              <a:t>，</a:t>
             </a:r>
             <a:r>
               <a:rPr lang="en-US" altLang="zh-CN" sz="1200" b="0" i="0" u="none" strike="noStrike" kern="1200" dirty="0" err="1">
@@ -8370,7 +8097,7 @@
                 <a:ea typeface="+mn-ea"/>
                 <a:cs typeface="+mn-cs"/>
               </a:rPr>
-              <a:t>都还没开始处理这些数据，它就会返回一个</a:t>
+              <a:t>可能都还没开始处理这些数据，它就会返回一个</a:t>
             </a:r>
             <a:r>
               <a:rPr lang="en-US" altLang="zh-CN" sz="1200" b="0" i="0" u="none" strike="noStrike" kern="1200" dirty="0">
@@ -8721,7 +8448,31 @@
                 <a:ea typeface="+mn-ea"/>
                 <a:cs typeface="+mn-cs"/>
               </a:rPr>
-              <a:t>的锁对象；第三点，协调器只读</a:t>
+              <a:t>的锁对象；第三点，</a:t>
+            </a:r>
+            <a:r>
+              <a:rPr lang="en-US" altLang="zh-CN" sz="1200" b="0" i="0" u="none" strike="noStrike" kern="1200" dirty="0">
+                <a:solidFill>
+                  <a:schemeClr val="tx1"/>
+                </a:solidFill>
+                <a:effectLst/>
+                <a:latin typeface="+mn-lt"/>
+                <a:ea typeface="+mn-ea"/>
+                <a:cs typeface="+mn-cs"/>
+              </a:rPr>
+              <a:t>coordinator</a:t>
+            </a:r>
+            <a:r>
+              <a:rPr lang="zh-CN" altLang="en-US" sz="1200" b="0" i="0" u="none" strike="noStrike" kern="1200" dirty="0">
+                <a:solidFill>
+                  <a:schemeClr val="tx1"/>
+                </a:solidFill>
+                <a:effectLst/>
+                <a:latin typeface="+mn-lt"/>
+                <a:ea typeface="+mn-ea"/>
+                <a:cs typeface="+mn-cs"/>
+              </a:rPr>
+              <a:t>只读</a:t>
             </a:r>
             <a:r>
               <a:rPr lang="en-US" altLang="zh-CN" sz="1200" b="0" i="0" u="none" strike="noStrike" kern="1200" dirty="0">
@@ -8946,7 +8697,7 @@
           <a:p>
             <a:fld id="{7308572E-AE8D-EC44-A20B-CE8A97A752EA}" type="datetimeFigureOut">
               <a:rPr kumimoji="1" lang="zh-CN" altLang="en-US" smtClean="0"/>
-              <a:t>2019/4/21</a:t>
+              <a:t>2019/4/25</a:t>
             </a:fld>
             <a:endParaRPr kumimoji="1" lang="zh-CN" altLang="en-US"/>
           </a:p>
@@ -9144,7 +8895,7 @@
           <a:p>
             <a:fld id="{7308572E-AE8D-EC44-A20B-CE8A97A752EA}" type="datetimeFigureOut">
               <a:rPr kumimoji="1" lang="zh-CN" altLang="en-US" smtClean="0"/>
-              <a:t>2019/4/21</a:t>
+              <a:t>2019/4/25</a:t>
             </a:fld>
             <a:endParaRPr kumimoji="1" lang="zh-CN" altLang="en-US"/>
           </a:p>
@@ -9352,7 +9103,7 @@
           <a:p>
             <a:fld id="{7308572E-AE8D-EC44-A20B-CE8A97A752EA}" type="datetimeFigureOut">
               <a:rPr kumimoji="1" lang="zh-CN" altLang="en-US" smtClean="0"/>
-              <a:t>2019/4/21</a:t>
+              <a:t>2019/4/25</a:t>
             </a:fld>
             <a:endParaRPr kumimoji="1" lang="zh-CN" altLang="en-US"/>
           </a:p>
@@ -9550,7 +9301,7 @@
           <a:p>
             <a:fld id="{7308572E-AE8D-EC44-A20B-CE8A97A752EA}" type="datetimeFigureOut">
               <a:rPr kumimoji="1" lang="zh-CN" altLang="en-US" smtClean="0"/>
-              <a:t>2019/4/21</a:t>
+              <a:t>2019/4/25</a:t>
             </a:fld>
             <a:endParaRPr kumimoji="1" lang="zh-CN" altLang="en-US"/>
           </a:p>
@@ -9825,7 +9576,7 @@
           <a:p>
             <a:fld id="{7308572E-AE8D-EC44-A20B-CE8A97A752EA}" type="datetimeFigureOut">
               <a:rPr kumimoji="1" lang="zh-CN" altLang="en-US" smtClean="0"/>
-              <a:t>2019/4/21</a:t>
+              <a:t>2019/4/25</a:t>
             </a:fld>
             <a:endParaRPr kumimoji="1" lang="zh-CN" altLang="en-US"/>
           </a:p>
@@ -10090,7 +9841,7 @@
           <a:p>
             <a:fld id="{7308572E-AE8D-EC44-A20B-CE8A97A752EA}" type="datetimeFigureOut">
               <a:rPr kumimoji="1" lang="zh-CN" altLang="en-US" smtClean="0"/>
-              <a:t>2019/4/21</a:t>
+              <a:t>2019/4/25</a:t>
             </a:fld>
             <a:endParaRPr kumimoji="1" lang="zh-CN" altLang="en-US"/>
           </a:p>
@@ -10502,7 +10253,7 @@
           <a:p>
             <a:fld id="{7308572E-AE8D-EC44-A20B-CE8A97A752EA}" type="datetimeFigureOut">
               <a:rPr kumimoji="1" lang="zh-CN" altLang="en-US" smtClean="0"/>
-              <a:t>2019/4/21</a:t>
+              <a:t>2019/4/25</a:t>
             </a:fld>
             <a:endParaRPr kumimoji="1" lang="zh-CN" altLang="en-US"/>
           </a:p>
@@ -10643,7 +10394,7 @@
           <a:p>
             <a:fld id="{7308572E-AE8D-EC44-A20B-CE8A97A752EA}" type="datetimeFigureOut">
               <a:rPr kumimoji="1" lang="zh-CN" altLang="en-US" smtClean="0"/>
-              <a:t>2019/4/21</a:t>
+              <a:t>2019/4/25</a:t>
             </a:fld>
             <a:endParaRPr kumimoji="1" lang="zh-CN" altLang="en-US"/>
           </a:p>
@@ -10756,7 +10507,7 @@
           <a:p>
             <a:fld id="{7308572E-AE8D-EC44-A20B-CE8A97A752EA}" type="datetimeFigureOut">
               <a:rPr kumimoji="1" lang="zh-CN" altLang="en-US" smtClean="0"/>
-              <a:t>2019/4/21</a:t>
+              <a:t>2019/4/25</a:t>
             </a:fld>
             <a:endParaRPr kumimoji="1" lang="zh-CN" altLang="en-US"/>
           </a:p>
@@ -11067,7 +10818,7 @@
           <a:p>
             <a:fld id="{7308572E-AE8D-EC44-A20B-CE8A97A752EA}" type="datetimeFigureOut">
               <a:rPr kumimoji="1" lang="zh-CN" altLang="en-US" smtClean="0"/>
-              <a:t>2019/4/21</a:t>
+              <a:t>2019/4/25</a:t>
             </a:fld>
             <a:endParaRPr kumimoji="1" lang="zh-CN" altLang="en-US"/>
           </a:p>
@@ -11355,7 +11106,7 @@
           <a:p>
             <a:fld id="{7308572E-AE8D-EC44-A20B-CE8A97A752EA}" type="datetimeFigureOut">
               <a:rPr kumimoji="1" lang="zh-CN" altLang="en-US" smtClean="0"/>
-              <a:t>2019/4/21</a:t>
+              <a:t>2019/4/25</a:t>
             </a:fld>
             <a:endParaRPr kumimoji="1" lang="zh-CN" altLang="en-US"/>
           </a:p>
@@ -11596,7 +11347,7 @@
           <a:p>
             <a:fld id="{7308572E-AE8D-EC44-A20B-CE8A97A752EA}" type="datetimeFigureOut">
               <a:rPr kumimoji="1" lang="zh-CN" altLang="en-US" smtClean="0"/>
-              <a:t>2019/4/21</a:t>
+              <a:t>2019/4/25</a:t>
             </a:fld>
             <a:endParaRPr kumimoji="1" lang="zh-CN" altLang="en-US"/>
           </a:p>
@@ -13664,30 +13415,21 @@
                             </p:childTnLst>
                           </p:cTn>
                         </p:par>
-                      </p:childTnLst>
-                    </p:cTn>
-                  </p:par>
-                  <p:par>
-                    <p:cTn id="18" fill="hold">
-                      <p:stCondLst>
-                        <p:cond delay="indefinite"/>
-                      </p:stCondLst>
-                      <p:childTnLst>
                         <p:par>
-                          <p:cTn id="19" fill="hold">
+                          <p:cTn id="18" fill="hold">
                             <p:stCondLst>
-                              <p:cond delay="0"/>
+                              <p:cond delay="3000"/>
                             </p:stCondLst>
                             <p:childTnLst>
                               <p:par>
-                                <p:cTn id="20" presetID="16" presetClass="exit" presetSubtype="21" fill="hold" grpId="1" nodeType="clickEffect">
+                                <p:cTn id="19" presetID="16" presetClass="exit" presetSubtype="21" fill="hold" grpId="1" nodeType="afterEffect">
                                   <p:stCondLst>
                                     <p:cond delay="0"/>
                                   </p:stCondLst>
                                   <p:childTnLst>
                                     <p:animEffect transition="out" filter="barn(inVertical)">
                                       <p:cBhvr>
-                                        <p:cTn id="21" dur="500"/>
+                                        <p:cTn id="20" dur="500"/>
                                         <p:tgtEl>
                                           <p:spTgt spid="32"/>
                                         </p:tgtEl>
@@ -13695,7 +13437,7 @@
                                     </p:animEffect>
                                     <p:set>
                                       <p:cBhvr>
-                                        <p:cTn id="22" dur="1" fill="hold">
+                                        <p:cTn id="21" dur="1" fill="hold">
                                           <p:stCondLst>
                                             <p:cond delay="499"/>
                                           </p:stCondLst>
@@ -13718,20 +13460,20 @@
                           </p:cTn>
                         </p:par>
                         <p:par>
-                          <p:cTn id="23" fill="hold">
+                          <p:cTn id="22" fill="hold">
                             <p:stCondLst>
-                              <p:cond delay="500"/>
+                              <p:cond delay="3500"/>
                             </p:stCondLst>
                             <p:childTnLst>
                               <p:par>
-                                <p:cTn id="24" presetID="22" presetClass="entr" presetSubtype="1" fill="hold" nodeType="afterEffect">
+                                <p:cTn id="23" presetID="22" presetClass="entr" presetSubtype="1" fill="hold" nodeType="afterEffect">
                                   <p:stCondLst>
                                     <p:cond delay="0"/>
                                   </p:stCondLst>
                                   <p:childTnLst>
                                     <p:set>
                                       <p:cBhvr>
-                                        <p:cTn id="25" dur="1" fill="hold">
+                                        <p:cTn id="24" dur="1" fill="hold">
                                           <p:stCondLst>
                                             <p:cond delay="0"/>
                                           </p:stCondLst>
@@ -13749,7 +13491,7 @@
                                     </p:set>
                                     <p:animEffect transition="in" filter="wipe(up)">
                                       <p:cBhvr>
-                                        <p:cTn id="26" dur="500"/>
+                                        <p:cTn id="25" dur="500"/>
                                         <p:tgtEl>
                                           <p:spTgt spid="24"/>
                                         </p:tgtEl>
@@ -13762,20 +13504,20 @@
                           </p:cTn>
                         </p:par>
                         <p:par>
-                          <p:cTn id="27" fill="hold">
+                          <p:cTn id="26" fill="hold">
                             <p:stCondLst>
-                              <p:cond delay="1000"/>
+                              <p:cond delay="4000"/>
                             </p:stCondLst>
                             <p:childTnLst>
                               <p:par>
-                                <p:cTn id="28" presetID="10" presetClass="entr" presetSubtype="0" fill="hold" grpId="0" nodeType="afterEffect">
+                                <p:cTn id="27" presetID="10" presetClass="entr" presetSubtype="0" fill="hold" grpId="0" nodeType="afterEffect">
                                   <p:stCondLst>
                                     <p:cond delay="0"/>
                                   </p:stCondLst>
                                   <p:childTnLst>
                                     <p:set>
                                       <p:cBhvr>
-                                        <p:cTn id="29" dur="1" fill="hold">
+                                        <p:cTn id="28" dur="1" fill="hold">
                                           <p:stCondLst>
                                             <p:cond delay="0"/>
                                           </p:stCondLst>
@@ -13793,7 +13535,7 @@
                                     </p:set>
                                     <p:animEffect transition="in" filter="fade">
                                       <p:cBhvr>
-                                        <p:cTn id="30" dur="500"/>
+                                        <p:cTn id="29" dur="500"/>
                                         <p:tgtEl>
                                           <p:spTgt spid="34"/>
                                         </p:tgtEl>
@@ -13806,20 +13548,20 @@
                           </p:cTn>
                         </p:par>
                         <p:par>
-                          <p:cTn id="31" fill="hold">
+                          <p:cTn id="30" fill="hold">
                             <p:stCondLst>
-                              <p:cond delay="1500"/>
+                              <p:cond delay="4500"/>
                             </p:stCondLst>
                             <p:childTnLst>
                               <p:par>
-                                <p:cTn id="32" presetID="22" presetClass="entr" presetSubtype="4" fill="hold" nodeType="afterEffect">
+                                <p:cTn id="31" presetID="22" presetClass="entr" presetSubtype="4" fill="hold" nodeType="afterEffect">
                                   <p:stCondLst>
                                     <p:cond delay="0"/>
                                   </p:stCondLst>
                                   <p:childTnLst>
                                     <p:set>
                                       <p:cBhvr>
-                                        <p:cTn id="33" dur="1" fill="hold">
+                                        <p:cTn id="32" dur="1" fill="hold">
                                           <p:stCondLst>
                                             <p:cond delay="0"/>
                                           </p:stCondLst>
@@ -13837,7 +13579,7 @@
                                     </p:set>
                                     <p:animEffect transition="in" filter="wipe(down)">
                                       <p:cBhvr>
-                                        <p:cTn id="34" dur="500"/>
+                                        <p:cTn id="33" dur="500"/>
                                         <p:tgtEl>
                                           <p:spTgt spid="29"/>
                                         </p:tgtEl>
@@ -13847,14 +13589,14 @@
                                 </p:cTn>
                               </p:par>
                               <p:par>
-                                <p:cTn id="35" presetID="0" presetClass="path" presetSubtype="0" accel="50000" decel="50000" fill="hold" nodeType="withEffect">
+                                <p:cTn id="34" presetID="0" presetClass="path" presetSubtype="0" accel="50000" decel="50000" fill="hold" nodeType="withEffect">
                                   <p:stCondLst>
                                     <p:cond delay="0"/>
                                   </p:stCondLst>
                                   <p:childTnLst>
                                     <p:animMotion origin="layout" path="M -0.00156 0.00209 L 0.01068 -0.12014 " pathEditMode="relative" rAng="0" ptsTypes="AA">
                                       <p:cBhvr>
-                                        <p:cTn id="36" dur="2000" fill="hold"/>
+                                        <p:cTn id="35" dur="2000" fill="hold"/>
                                         <p:tgtEl>
                                           <p:spTgt spid="34"/>
                                         </p:tgtEl>
@@ -13871,30 +13613,21 @@
                             </p:childTnLst>
                           </p:cTn>
                         </p:par>
-                      </p:childTnLst>
-                    </p:cTn>
-                  </p:par>
-                  <p:par>
-                    <p:cTn id="37" fill="hold">
-                      <p:stCondLst>
-                        <p:cond delay="indefinite"/>
-                      </p:stCondLst>
-                      <p:childTnLst>
                         <p:par>
-                          <p:cTn id="38" fill="hold">
+                          <p:cTn id="36" fill="hold">
                             <p:stCondLst>
-                              <p:cond delay="0"/>
+                              <p:cond delay="6500"/>
                             </p:stCondLst>
                             <p:childTnLst>
                               <p:par>
-                                <p:cTn id="39" presetID="16" presetClass="exit" presetSubtype="21" fill="hold" grpId="1" nodeType="clickEffect">
+                                <p:cTn id="37" presetID="16" presetClass="exit" presetSubtype="21" fill="hold" grpId="1" nodeType="afterEffect">
                                   <p:stCondLst>
                                     <p:cond delay="0"/>
                                   </p:stCondLst>
                                   <p:childTnLst>
                                     <p:animEffect transition="out" filter="barn(inVertical)">
                                       <p:cBhvr>
-                                        <p:cTn id="40" dur="500"/>
+                                        <p:cTn id="38" dur="500"/>
                                         <p:tgtEl>
                                           <p:spTgt spid="34"/>
                                         </p:tgtEl>
@@ -13902,7 +13635,7 @@
                                     </p:animEffect>
                                     <p:set>
                                       <p:cBhvr>
-                                        <p:cTn id="41" dur="1" fill="hold">
+                                        <p:cTn id="39" dur="1" fill="hold">
                                           <p:stCondLst>
                                             <p:cond delay="499"/>
                                           </p:stCondLst>
@@ -13925,20 +13658,20 @@
                           </p:cTn>
                         </p:par>
                         <p:par>
-                          <p:cTn id="42" fill="hold">
+                          <p:cTn id="40" fill="hold">
                             <p:stCondLst>
-                              <p:cond delay="500"/>
+                              <p:cond delay="7000"/>
                             </p:stCondLst>
                             <p:childTnLst>
                               <p:par>
-                                <p:cTn id="43" presetID="22" presetClass="entr" presetSubtype="1" fill="hold" nodeType="afterEffect">
+                                <p:cTn id="41" presetID="22" presetClass="entr" presetSubtype="1" fill="hold" nodeType="afterEffect">
                                   <p:stCondLst>
                                     <p:cond delay="0"/>
                                   </p:stCondLst>
                                   <p:childTnLst>
                                     <p:set>
                                       <p:cBhvr>
-                                        <p:cTn id="44" dur="1" fill="hold">
+                                        <p:cTn id="42" dur="1" fill="hold">
                                           <p:stCondLst>
                                             <p:cond delay="0"/>
                                           </p:stCondLst>
@@ -13956,7 +13689,7 @@
                                     </p:set>
                                     <p:animEffect transition="in" filter="wipe(up)">
                                       <p:cBhvr>
-                                        <p:cTn id="45" dur="500"/>
+                                        <p:cTn id="43" dur="500"/>
                                         <p:tgtEl>
                                           <p:spTgt spid="25"/>
                                         </p:tgtEl>
@@ -13969,20 +13702,20 @@
                           </p:cTn>
                         </p:par>
                         <p:par>
-                          <p:cTn id="46" fill="hold">
+                          <p:cTn id="44" fill="hold">
                             <p:stCondLst>
-                              <p:cond delay="1000"/>
+                              <p:cond delay="7500"/>
                             </p:stCondLst>
                             <p:childTnLst>
                               <p:par>
-                                <p:cTn id="47" presetID="10" presetClass="entr" presetSubtype="0" fill="hold" grpId="0" nodeType="afterEffect">
+                                <p:cTn id="45" presetID="10" presetClass="entr" presetSubtype="0" fill="hold" grpId="0" nodeType="afterEffect">
                                   <p:stCondLst>
                                     <p:cond delay="0"/>
                                   </p:stCondLst>
                                   <p:childTnLst>
                                     <p:set>
                                       <p:cBhvr>
-                                        <p:cTn id="48" dur="1" fill="hold">
+                                        <p:cTn id="46" dur="1" fill="hold">
                                           <p:stCondLst>
                                             <p:cond delay="0"/>
                                           </p:stCondLst>
@@ -14000,7 +13733,7 @@
                                     </p:set>
                                     <p:animEffect transition="in" filter="fade">
                                       <p:cBhvr>
-                                        <p:cTn id="49" dur="500"/>
+                                        <p:cTn id="47" dur="500"/>
                                         <p:tgtEl>
                                           <p:spTgt spid="35"/>
                                         </p:tgtEl>
@@ -14013,20 +13746,20 @@
                           </p:cTn>
                         </p:par>
                         <p:par>
-                          <p:cTn id="50" fill="hold">
+                          <p:cTn id="48" fill="hold">
                             <p:stCondLst>
-                              <p:cond delay="1500"/>
+                              <p:cond delay="8000"/>
                             </p:stCondLst>
                             <p:childTnLst>
                               <p:par>
-                                <p:cTn id="51" presetID="22" presetClass="entr" presetSubtype="4" fill="hold" nodeType="afterEffect">
+                                <p:cTn id="49" presetID="22" presetClass="entr" presetSubtype="4" fill="hold" nodeType="afterEffect">
                                   <p:stCondLst>
                                     <p:cond delay="0"/>
                                   </p:stCondLst>
                                   <p:childTnLst>
                                     <p:set>
                                       <p:cBhvr>
-                                        <p:cTn id="52" dur="1" fill="hold">
+                                        <p:cTn id="50" dur="1" fill="hold">
                                           <p:stCondLst>
                                             <p:cond delay="0"/>
                                           </p:stCondLst>
@@ -14044,7 +13777,7 @@
                                     </p:set>
                                     <p:animEffect transition="in" filter="wipe(down)">
                                       <p:cBhvr>
-                                        <p:cTn id="53" dur="500"/>
+                                        <p:cTn id="51" dur="500"/>
                                         <p:tgtEl>
                                           <p:spTgt spid="30"/>
                                         </p:tgtEl>
@@ -14054,14 +13787,14 @@
                                 </p:cTn>
                               </p:par>
                               <p:par>
-                                <p:cTn id="54" presetID="0" presetClass="path" presetSubtype="0" accel="50000" decel="50000" fill="hold" nodeType="withEffect">
+                                <p:cTn id="52" presetID="0" presetClass="path" presetSubtype="0" accel="50000" decel="50000" fill="hold" nodeType="withEffect">
                                   <p:stCondLst>
                                     <p:cond delay="0"/>
                                   </p:stCondLst>
                                   <p:childTnLst>
                                     <p:animMotion origin="layout" path="M -0.00156 0.0044 L 0.0155 -0.3676 " pathEditMode="relative" rAng="0" ptsTypes="AA">
                                       <p:cBhvr>
-                                        <p:cTn id="55" dur="2000" fill="hold"/>
+                                        <p:cTn id="53" dur="2000" fill="hold"/>
                                         <p:tgtEl>
                                           <p:spTgt spid="35"/>
                                         </p:tgtEl>
@@ -14082,26 +13815,26 @@
                     </p:cTn>
                   </p:par>
                   <p:par>
-                    <p:cTn id="56" fill="hold">
+                    <p:cTn id="54" fill="hold">
                       <p:stCondLst>
                         <p:cond delay="indefinite"/>
                       </p:stCondLst>
                       <p:childTnLst>
                         <p:par>
-                          <p:cTn id="57" fill="hold">
+                          <p:cTn id="55" fill="hold">
                             <p:stCondLst>
                               <p:cond delay="0"/>
                             </p:stCondLst>
                             <p:childTnLst>
                               <p:par>
-                                <p:cTn id="58" presetID="16" presetClass="exit" presetSubtype="21" fill="hold" grpId="1" nodeType="clickEffect">
+                                <p:cTn id="56" presetID="16" presetClass="exit" presetSubtype="21" fill="hold" grpId="1" nodeType="clickEffect">
                                   <p:stCondLst>
                                     <p:cond delay="0"/>
                                   </p:stCondLst>
                                   <p:childTnLst>
                                     <p:animEffect transition="out" filter="barn(inVertical)">
                                       <p:cBhvr>
-                                        <p:cTn id="59" dur="500"/>
+                                        <p:cTn id="57" dur="500"/>
                                         <p:tgtEl>
                                           <p:spTgt spid="35"/>
                                         </p:tgtEl>
@@ -14109,7 +13842,7 @@
                                     </p:animEffect>
                                     <p:set>
                                       <p:cBhvr>
-                                        <p:cTn id="60" dur="1" fill="hold">
+                                        <p:cTn id="58" dur="1" fill="hold">
                                           <p:stCondLst>
                                             <p:cond delay="499"/>
                                           </p:stCondLst>
@@ -14132,20 +13865,20 @@
                           </p:cTn>
                         </p:par>
                         <p:par>
-                          <p:cTn id="61" fill="hold">
+                          <p:cTn id="59" fill="hold">
                             <p:stCondLst>
                               <p:cond delay="500"/>
                             </p:stCondLst>
                             <p:childTnLst>
                               <p:par>
-                                <p:cTn id="62" presetID="22" presetClass="entr" presetSubtype="4" fill="hold" nodeType="afterEffect">
+                                <p:cTn id="60" presetID="22" presetClass="entr" presetSubtype="4" fill="hold" nodeType="afterEffect">
                                   <p:stCondLst>
                                     <p:cond delay="0"/>
                                   </p:stCondLst>
                                   <p:childTnLst>
                                     <p:set>
                                       <p:cBhvr>
-                                        <p:cTn id="63" dur="1" fill="hold">
+                                        <p:cTn id="61" dur="1" fill="hold">
                                           <p:stCondLst>
                                             <p:cond delay="0"/>
                                           </p:stCondLst>
@@ -14163,7 +13896,7 @@
                                     </p:set>
                                     <p:animEffect transition="in" filter="wipe(down)">
                                       <p:cBhvr>
-                                        <p:cTn id="64" dur="500"/>
+                                        <p:cTn id="62" dur="500"/>
                                         <p:tgtEl>
                                           <p:spTgt spid="40"/>
                                         </p:tgtEl>
@@ -16491,30 +16224,21 @@
                             </p:childTnLst>
                           </p:cTn>
                         </p:par>
-                      </p:childTnLst>
-                    </p:cTn>
-                  </p:par>
-                  <p:par>
-                    <p:cTn id="36" fill="hold">
-                      <p:stCondLst>
-                        <p:cond delay="indefinite"/>
-                      </p:stCondLst>
-                      <p:childTnLst>
                         <p:par>
-                          <p:cTn id="37" fill="hold">
+                          <p:cTn id="36" fill="hold">
                             <p:stCondLst>
-                              <p:cond delay="0"/>
+                              <p:cond delay="2500"/>
                             </p:stCondLst>
                             <p:childTnLst>
                               <p:par>
-                                <p:cTn id="38" presetID="22" presetClass="entr" presetSubtype="1" fill="hold" nodeType="clickEffect">
+                                <p:cTn id="37" presetID="22" presetClass="entr" presetSubtype="1" fill="hold" nodeType="afterEffect">
                                   <p:stCondLst>
                                     <p:cond delay="0"/>
                                   </p:stCondLst>
                                   <p:childTnLst>
                                     <p:set>
                                       <p:cBhvr>
-                                        <p:cTn id="39" dur="1" fill="hold">
+                                        <p:cTn id="38" dur="1" fill="hold">
                                           <p:stCondLst>
                                             <p:cond delay="0"/>
                                           </p:stCondLst>
@@ -16532,7 +16256,7 @@
                                     </p:set>
                                     <p:animEffect transition="in" filter="wipe(up)">
                                       <p:cBhvr>
-                                        <p:cTn id="40" dur="500"/>
+                                        <p:cTn id="39" dur="500"/>
                                         <p:tgtEl>
                                           <p:spTgt spid="56"/>
                                         </p:tgtEl>
@@ -16542,14 +16266,14 @@
                                 </p:cTn>
                               </p:par>
                               <p:par>
-                                <p:cTn id="41" presetID="22" presetClass="entr" presetSubtype="1" fill="hold" nodeType="withEffect">
+                                <p:cTn id="40" presetID="22" presetClass="entr" presetSubtype="1" fill="hold" nodeType="withEffect">
                                   <p:stCondLst>
                                     <p:cond delay="0"/>
                                   </p:stCondLst>
                                   <p:childTnLst>
                                     <p:set>
                                       <p:cBhvr>
-                                        <p:cTn id="42" dur="1" fill="hold">
+                                        <p:cTn id="41" dur="1" fill="hold">
                                           <p:stCondLst>
                                             <p:cond delay="0"/>
                                           </p:stCondLst>
@@ -16567,7 +16291,7 @@
                                     </p:set>
                                     <p:animEffect transition="in" filter="wipe(up)">
                                       <p:cBhvr>
-                                        <p:cTn id="43" dur="500"/>
+                                        <p:cTn id="42" dur="500"/>
                                         <p:tgtEl>
                                           <p:spTgt spid="55"/>
                                         </p:tgtEl>
@@ -16580,20 +16304,20 @@
                           </p:cTn>
                         </p:par>
                         <p:par>
-                          <p:cTn id="44" fill="hold">
+                          <p:cTn id="43" fill="hold">
                             <p:stCondLst>
-                              <p:cond delay="500"/>
+                              <p:cond delay="3000"/>
                             </p:stCondLst>
                             <p:childTnLst>
                               <p:par>
-                                <p:cTn id="45" presetID="22" presetClass="entr" presetSubtype="1" fill="hold" nodeType="afterEffect">
+                                <p:cTn id="44" presetID="22" presetClass="entr" presetSubtype="1" fill="hold" nodeType="afterEffect">
                                   <p:stCondLst>
                                     <p:cond delay="0"/>
                                   </p:stCondLst>
                                   <p:childTnLst>
                                     <p:set>
                                       <p:cBhvr>
-                                        <p:cTn id="46" dur="1" fill="hold">
+                                        <p:cTn id="45" dur="1" fill="hold">
                                           <p:stCondLst>
                                             <p:cond delay="0"/>
                                           </p:stCondLst>
@@ -16611,7 +16335,7 @@
                                     </p:set>
                                     <p:animEffect transition="in" filter="wipe(up)">
                                       <p:cBhvr>
-                                        <p:cTn id="47" dur="500"/>
+                                        <p:cTn id="46" dur="500"/>
                                         <p:tgtEl>
                                           <p:spTgt spid="57"/>
                                         </p:tgtEl>
@@ -16621,14 +16345,14 @@
                                 </p:cTn>
                               </p:par>
                               <p:par>
-                                <p:cTn id="48" presetID="22" presetClass="entr" presetSubtype="1" fill="hold" nodeType="withEffect">
+                                <p:cTn id="47" presetID="22" presetClass="entr" presetSubtype="1" fill="hold" nodeType="withEffect">
                                   <p:stCondLst>
                                     <p:cond delay="0"/>
                                   </p:stCondLst>
                                   <p:childTnLst>
                                     <p:set>
                                       <p:cBhvr>
-                                        <p:cTn id="49" dur="1" fill="hold">
+                                        <p:cTn id="48" dur="1" fill="hold">
                                           <p:stCondLst>
                                             <p:cond delay="0"/>
                                           </p:stCondLst>
@@ -16646,7 +16370,7 @@
                                     </p:set>
                                     <p:animEffect transition="in" filter="wipe(up)">
                                       <p:cBhvr>
-                                        <p:cTn id="50" dur="500"/>
+                                        <p:cTn id="49" dur="500"/>
                                         <p:tgtEl>
                                           <p:spTgt spid="58"/>
                                         </p:tgtEl>
@@ -16659,20 +16383,20 @@
                           </p:cTn>
                         </p:par>
                         <p:par>
-                          <p:cTn id="51" fill="hold">
+                          <p:cTn id="50" fill="hold">
                             <p:stCondLst>
-                              <p:cond delay="1000"/>
+                              <p:cond delay="3500"/>
                             </p:stCondLst>
                             <p:childTnLst>
                               <p:par>
-                                <p:cTn id="52" presetID="22" presetClass="entr" presetSubtype="4" fill="hold" nodeType="afterEffect">
+                                <p:cTn id="51" presetID="22" presetClass="entr" presetSubtype="4" fill="hold" nodeType="afterEffect">
                                   <p:stCondLst>
                                     <p:cond delay="0"/>
                                   </p:stCondLst>
                                   <p:childTnLst>
                                     <p:set>
                                       <p:cBhvr>
-                                        <p:cTn id="53" dur="1" fill="hold">
+                                        <p:cTn id="52" dur="1" fill="hold">
                                           <p:stCondLst>
                                             <p:cond delay="0"/>
                                           </p:stCondLst>
@@ -16690,7 +16414,7 @@
                                     </p:set>
                                     <p:animEffect transition="in" filter="wipe(down)">
                                       <p:cBhvr>
-                                        <p:cTn id="54" dur="500"/>
+                                        <p:cTn id="53" dur="500"/>
                                         <p:tgtEl>
                                           <p:spTgt spid="59"/>
                                         </p:tgtEl>
@@ -16700,14 +16424,14 @@
                                 </p:cTn>
                               </p:par>
                               <p:par>
-                                <p:cTn id="55" presetID="22" presetClass="entr" presetSubtype="4" fill="hold" nodeType="withEffect">
+                                <p:cTn id="54" presetID="22" presetClass="entr" presetSubtype="4" fill="hold" nodeType="withEffect">
                                   <p:stCondLst>
                                     <p:cond delay="0"/>
                                   </p:stCondLst>
                                   <p:childTnLst>
                                     <p:set>
                                       <p:cBhvr>
-                                        <p:cTn id="56" dur="1" fill="hold">
+                                        <p:cTn id="55" dur="1" fill="hold">
                                           <p:stCondLst>
                                             <p:cond delay="0"/>
                                           </p:stCondLst>
@@ -16725,7 +16449,7 @@
                                     </p:set>
                                     <p:animEffect transition="in" filter="wipe(down)">
                                       <p:cBhvr>
-                                        <p:cTn id="57" dur="500"/>
+                                        <p:cTn id="56" dur="500"/>
                                         <p:tgtEl>
                                           <p:spTgt spid="60"/>
                                         </p:tgtEl>
@@ -16738,20 +16462,20 @@
                           </p:cTn>
                         </p:par>
                         <p:par>
-                          <p:cTn id="58" fill="hold">
+                          <p:cTn id="57" fill="hold">
                             <p:stCondLst>
-                              <p:cond delay="1500"/>
+                              <p:cond delay="4000"/>
                             </p:stCondLst>
                             <p:childTnLst>
                               <p:par>
-                                <p:cTn id="59" presetID="22" presetClass="entr" presetSubtype="4" fill="hold" nodeType="afterEffect">
+                                <p:cTn id="58" presetID="22" presetClass="entr" presetSubtype="4" fill="hold" nodeType="afterEffect">
                                   <p:stCondLst>
                                     <p:cond delay="0"/>
                                   </p:stCondLst>
                                   <p:childTnLst>
                                     <p:set>
                                       <p:cBhvr>
-                                        <p:cTn id="60" dur="1" fill="hold">
+                                        <p:cTn id="59" dur="1" fill="hold">
                                           <p:stCondLst>
                                             <p:cond delay="0"/>
                                           </p:stCondLst>
@@ -16769,7 +16493,7 @@
                                     </p:set>
                                     <p:animEffect transition="in" filter="wipe(down)">
                                       <p:cBhvr>
-                                        <p:cTn id="61" dur="500"/>
+                                        <p:cTn id="60" dur="500"/>
                                         <p:tgtEl>
                                           <p:spTgt spid="62"/>
                                         </p:tgtEl>
@@ -16779,14 +16503,14 @@
                                 </p:cTn>
                               </p:par>
                               <p:par>
-                                <p:cTn id="62" presetID="22" presetClass="entr" presetSubtype="4" fill="hold" nodeType="withEffect">
+                                <p:cTn id="61" presetID="22" presetClass="entr" presetSubtype="4" fill="hold" nodeType="withEffect">
                                   <p:stCondLst>
                                     <p:cond delay="0"/>
                                   </p:stCondLst>
                                   <p:childTnLst>
                                     <p:set>
                                       <p:cBhvr>
-                                        <p:cTn id="63" dur="1" fill="hold">
+                                        <p:cTn id="62" dur="1" fill="hold">
                                           <p:stCondLst>
                                             <p:cond delay="0"/>
                                           </p:stCondLst>
@@ -16804,7 +16528,7 @@
                                     </p:set>
                                     <p:animEffect transition="in" filter="wipe(down)">
                                       <p:cBhvr>
-                                        <p:cTn id="64" dur="500"/>
+                                        <p:cTn id="63" dur="500"/>
                                         <p:tgtEl>
                                           <p:spTgt spid="61"/>
                                         </p:tgtEl>
@@ -16817,20 +16541,20 @@
                           </p:cTn>
                         </p:par>
                         <p:par>
-                          <p:cTn id="65" fill="hold">
+                          <p:cTn id="64" fill="hold">
                             <p:stCondLst>
-                              <p:cond delay="2000"/>
+                              <p:cond delay="4500"/>
                             </p:stCondLst>
                             <p:childTnLst>
                               <p:par>
-                                <p:cTn id="66" presetID="14" presetClass="entr" presetSubtype="10" fill="hold" grpId="0" nodeType="afterEffect">
+                                <p:cTn id="65" presetID="14" presetClass="entr" presetSubtype="10" fill="hold" grpId="0" nodeType="afterEffect">
                                   <p:stCondLst>
                                     <p:cond delay="0"/>
                                   </p:stCondLst>
                                   <p:childTnLst>
                                     <p:set>
                                       <p:cBhvr>
-                                        <p:cTn id="67" dur="1" fill="hold">
+                                        <p:cTn id="66" dur="1" fill="hold">
                                           <p:stCondLst>
                                             <p:cond delay="0"/>
                                           </p:stCondLst>
@@ -16848,7 +16572,7 @@
                                     </p:set>
                                     <p:animEffect transition="in" filter="randombar(horizontal)">
                                       <p:cBhvr>
-                                        <p:cTn id="68" dur="500"/>
+                                        <p:cTn id="67" dur="500"/>
                                         <p:tgtEl>
                                           <p:spTgt spid="54"/>
                                         </p:tgtEl>
@@ -20313,7 +20037,7 @@
 </file>
 
 <file path=ppt/slides/slide17.xml><?xml version="1.0" encoding="utf-8"?>
-<p:sld xmlns:a="http://schemas.openxmlformats.org/drawingml/2006/main" xmlns:r="http://schemas.openxmlformats.org/officeDocument/2006/relationships" xmlns:p="http://schemas.openxmlformats.org/presentationml/2006/main">
+<p:sld xmlns:a="http://schemas.openxmlformats.org/drawingml/2006/main" xmlns:r="http://schemas.openxmlformats.org/officeDocument/2006/relationships" xmlns:p="http://schemas.openxmlformats.org/presentationml/2006/main" show="0">
   <p:cSld>
     <p:spTree>
       <p:nvGrpSpPr>
@@ -24993,15 +24717,7 @@
           <a:p>
             <a:r>
               <a:rPr kumimoji="1" lang="en-US" altLang="zh-CN" sz="3600" dirty="0"/>
-              <a:t>Transaction</a:t>
-            </a:r>
-            <a:r>
-              <a:rPr kumimoji="1" lang="zh-CN" altLang="en-US" sz="3600" dirty="0"/>
-              <a:t> </a:t>
-            </a:r>
-            <a:r>
-              <a:rPr kumimoji="1" lang="en-US" altLang="zh-CN" sz="3600" dirty="0"/>
-              <a:t>recovery</a:t>
+              <a:t>Reconfiguration</a:t>
             </a:r>
           </a:p>
         </p:txBody>
@@ -25020,10 +24736,10 @@
         </p:nvGrpSpPr>
         <p:grpSpPr>
           <a:xfrm>
-            <a:off x="1075226" y="1978968"/>
-            <a:ext cx="10226187" cy="461665"/>
-            <a:chOff x="1075226" y="1898005"/>
-            <a:chExt cx="10226187" cy="461665"/>
+            <a:off x="937368" y="1992486"/>
+            <a:ext cx="10364045" cy="461665"/>
+            <a:chOff x="937368" y="1911523"/>
+            <a:chExt cx="10364045" cy="461665"/>
           </a:xfrm>
         </p:grpSpPr>
         <p:cxnSp>
@@ -25085,8 +24801,8 @@
           </p:nvSpPr>
           <p:spPr>
             <a:xfrm>
-              <a:off x="1075226" y="1898005"/>
-              <a:ext cx="354584" cy="461665"/>
+              <a:off x="937368" y="1911523"/>
+              <a:ext cx="641522" cy="461665"/>
             </a:xfrm>
             <a:prstGeom prst="rect">
               <a:avLst/>
@@ -25101,7 +24817,7 @@
             <a:p>
               <a:r>
                 <a:rPr kumimoji="1" lang="en-US" altLang="zh-CN" sz="2400" dirty="0"/>
-                <a:t>P</a:t>
+                <a:t>CM</a:t>
               </a:r>
               <a:endParaRPr kumimoji="1" lang="zh-CN" altLang="en-US" sz="2400" dirty="0"/>
             </a:p>
@@ -25188,7 +24904,7 @@
           <p:spPr>
             <a:xfrm>
               <a:off x="1027136" y="1898005"/>
-              <a:ext cx="463588" cy="461665"/>
+              <a:ext cx="450764" cy="461665"/>
             </a:xfrm>
             <a:prstGeom prst="rect">
               <a:avLst/>
@@ -25203,7 +24919,7 @@
             <a:p>
               <a:r>
                 <a:rPr kumimoji="1" lang="en-US" altLang="zh-CN" sz="2400" dirty="0"/>
-                <a:t>B</a:t>
+                <a:t>S</a:t>
               </a:r>
               <a:r>
                 <a:rPr kumimoji="1" lang="en-US" altLang="zh-CN" sz="2400" baseline="-25000" dirty="0"/>
@@ -25294,7 +25010,7 @@
           <p:spPr>
             <a:xfrm>
               <a:off x="1027136" y="1898005"/>
-              <a:ext cx="463588" cy="461665"/>
+              <a:ext cx="450764" cy="461665"/>
             </a:xfrm>
             <a:prstGeom prst="rect">
               <a:avLst/>
@@ -25309,7 +25025,7 @@
             <a:p>
               <a:r>
                 <a:rPr kumimoji="1" lang="en-US" altLang="zh-CN" sz="2400" dirty="0"/>
-                <a:t>B</a:t>
+                <a:t>S</a:t>
               </a:r>
               <a:r>
                 <a:rPr kumimoji="1" lang="en-US" altLang="zh-CN" sz="2400" baseline="-25000" dirty="0"/>
@@ -25400,7 +25116,7 @@
           <p:spPr>
             <a:xfrm>
               <a:off x="1027136" y="1898005"/>
-              <a:ext cx="375424" cy="461665"/>
+              <a:ext cx="450764" cy="461665"/>
             </a:xfrm>
             <a:prstGeom prst="rect">
               <a:avLst/>
@@ -25415,19 +25131,132 @@
             <a:p>
               <a:r>
                 <a:rPr kumimoji="1" lang="en-US" altLang="zh-CN" sz="2400" dirty="0"/>
-                <a:t>C</a:t>
+                <a:t>S</a:t>
+              </a:r>
+              <a:r>
+                <a:rPr kumimoji="1" lang="en-US" altLang="zh-CN" sz="2400" baseline="-25000" dirty="0"/>
+                <a:t>3</a:t>
               </a:r>
               <a:endParaRPr kumimoji="1" lang="zh-CN" altLang="en-US" sz="2400" baseline="-25000" dirty="0"/>
             </a:p>
           </p:txBody>
         </p:sp>
       </p:grpSp>
+      <p:grpSp>
+        <p:nvGrpSpPr>
+          <p:cNvPr id="15" name="组合 14">
+            <a:extLst>
+              <a:ext uri="{FF2B5EF4-FFF2-40B4-BE49-F238E27FC236}">
+                <a16:creationId xmlns:a16="http://schemas.microsoft.com/office/drawing/2014/main" id="{C2D14110-570E-7648-85D8-D709E308B152}"/>
+              </a:ext>
+            </a:extLst>
+          </p:cNvPr>
+          <p:cNvGrpSpPr/>
+          <p:nvPr/>
+        </p:nvGrpSpPr>
+        <p:grpSpPr>
+          <a:xfrm>
+            <a:off x="2137773" y="1681672"/>
+            <a:ext cx="641522" cy="461665"/>
+            <a:chOff x="8519984" y="1584484"/>
+            <a:chExt cx="1526384" cy="922205"/>
+          </a:xfrm>
+        </p:grpSpPr>
+        <p:sp>
+          <p:nvSpPr>
+            <p:cNvPr id="16" name="云形 15">
+              <a:extLst>
+                <a:ext uri="{FF2B5EF4-FFF2-40B4-BE49-F238E27FC236}">
+                  <a16:creationId xmlns:a16="http://schemas.microsoft.com/office/drawing/2014/main" id="{13BC12F1-C296-AB43-B9EC-AD658F5F838B}"/>
+                </a:ext>
+              </a:extLst>
+            </p:cNvPr>
+            <p:cNvSpPr/>
+            <p:nvPr/>
+          </p:nvSpPr>
+          <p:spPr>
+            <a:xfrm>
+              <a:off x="8519984" y="1584484"/>
+              <a:ext cx="1526384" cy="922205"/>
+            </a:xfrm>
+            <a:prstGeom prst="cloud">
+              <a:avLst/>
+            </a:prstGeom>
+            <a:noFill/>
+            <a:ln>
+              <a:solidFill>
+                <a:schemeClr val="tx1"/>
+              </a:solidFill>
+            </a:ln>
+          </p:spPr>
+          <p:style>
+            <a:lnRef idx="2">
+              <a:schemeClr val="accent1">
+                <a:shade val="50000"/>
+              </a:schemeClr>
+            </a:lnRef>
+            <a:fillRef idx="1">
+              <a:schemeClr val="accent1"/>
+            </a:fillRef>
+            <a:effectRef idx="0">
+              <a:schemeClr val="accent1"/>
+            </a:effectRef>
+            <a:fontRef idx="minor">
+              <a:schemeClr val="lt1"/>
+            </a:fontRef>
+          </p:style>
+          <p:txBody>
+            <a:bodyPr rtlCol="0" anchor="ctr"/>
+            <a:lstStyle/>
+            <a:p>
+              <a:pPr algn="ctr"/>
+              <a:endParaRPr kumimoji="1" lang="zh-CN" altLang="en-US"/>
+            </a:p>
+          </p:txBody>
+        </p:sp>
+        <p:sp>
+          <p:nvSpPr>
+            <p:cNvPr id="17" name="文本框 16">
+              <a:extLst>
+                <a:ext uri="{FF2B5EF4-FFF2-40B4-BE49-F238E27FC236}">
+                  <a16:creationId xmlns:a16="http://schemas.microsoft.com/office/drawing/2014/main" id="{DB69EAD7-A28A-2C47-B83B-F95305EFA7FF}"/>
+                </a:ext>
+              </a:extLst>
+            </p:cNvPr>
+            <p:cNvSpPr txBox="1"/>
+            <p:nvPr/>
+          </p:nvSpPr>
+          <p:spPr>
+            <a:xfrm>
+              <a:off x="8784550" y="1686506"/>
+              <a:ext cx="444352" cy="369331"/>
+            </a:xfrm>
+            <a:prstGeom prst="rect">
+              <a:avLst/>
+            </a:prstGeom>
+            <a:noFill/>
+          </p:spPr>
+          <p:txBody>
+            <a:bodyPr wrap="none" rtlCol="0">
+              <a:spAutoFit/>
+            </a:bodyPr>
+            <a:lstStyle/>
+            <a:p>
+              <a:r>
+                <a:rPr kumimoji="1" lang="en-US" altLang="zh-CN" dirty="0"/>
+                <a:t>ZK</a:t>
+              </a:r>
+              <a:endParaRPr kumimoji="1" lang="zh-CN" altLang="en-US" dirty="0"/>
+            </a:p>
+          </p:txBody>
+        </p:sp>
+      </p:grpSp>
       <p:sp>
         <p:nvSpPr>
-          <p:cNvPr id="23" name="文本框 22">
+          <p:cNvPr id="18" name="文本框 17">
             <a:extLst>
               <a:ext uri="{FF2B5EF4-FFF2-40B4-BE49-F238E27FC236}">
-                <a16:creationId xmlns:a16="http://schemas.microsoft.com/office/drawing/2014/main" id="{6B30C582-809F-424D-A558-41E129145300}"/>
+                <a16:creationId xmlns:a16="http://schemas.microsoft.com/office/drawing/2014/main" id="{3613D043-11BA-6149-9263-7EFA94AA6DFA}"/>
               </a:ext>
             </a:extLst>
           </p:cNvPr>
@@ -25436,7 +25265,705 @@
         </p:nvSpPr>
         <p:spPr>
           <a:xfrm>
-            <a:off x="1490724" y="3237382"/>
+            <a:off x="1998311" y="2335948"/>
+            <a:ext cx="920445" cy="646331"/>
+          </a:xfrm>
+          <a:prstGeom prst="rect">
+            <a:avLst/>
+          </a:prstGeom>
+          <a:noFill/>
+        </p:spPr>
+        <p:txBody>
+          <a:bodyPr wrap="none" rtlCol="0">
+            <a:spAutoFit/>
+          </a:bodyPr>
+          <a:lstStyle/>
+          <a:p>
+            <a:r>
+              <a:rPr kumimoji="1" lang="en-US" altLang="zh-CN" dirty="0"/>
+              <a:t>Remap</a:t>
+            </a:r>
+          </a:p>
+          <a:p>
+            <a:r>
+              <a:rPr kumimoji="1" lang="en-US" altLang="zh-CN" dirty="0"/>
+              <a:t>regions</a:t>
+            </a:r>
+            <a:endParaRPr kumimoji="1" lang="zh-CN" altLang="en-US" dirty="0"/>
+          </a:p>
+        </p:txBody>
+      </p:sp>
+      <p:sp>
+        <p:nvSpPr>
+          <p:cNvPr id="20" name="文本框 19">
+            <a:extLst>
+              <a:ext uri="{FF2B5EF4-FFF2-40B4-BE49-F238E27FC236}">
+                <a16:creationId xmlns:a16="http://schemas.microsoft.com/office/drawing/2014/main" id="{46CAC2F7-E7A5-CB42-9121-95F2281C953A}"/>
+              </a:ext>
+            </a:extLst>
+          </p:cNvPr>
+          <p:cNvSpPr txBox="1"/>
+          <p:nvPr/>
+        </p:nvSpPr>
+        <p:spPr>
+          <a:xfrm>
+            <a:off x="3335813" y="1757303"/>
+            <a:ext cx="1402948" cy="369332"/>
+          </a:xfrm>
+          <a:prstGeom prst="rect">
+            <a:avLst/>
+          </a:prstGeom>
+          <a:noFill/>
+        </p:spPr>
+        <p:txBody>
+          <a:bodyPr wrap="none" rtlCol="0">
+            <a:spAutoFit/>
+          </a:bodyPr>
+          <a:lstStyle/>
+          <a:p>
+            <a:r>
+              <a:rPr kumimoji="1" lang="en-US" altLang="zh-CN" dirty="0"/>
+              <a:t>Config-New</a:t>
+            </a:r>
+            <a:endParaRPr kumimoji="1" lang="zh-CN" altLang="en-US" dirty="0"/>
+          </a:p>
+        </p:txBody>
+      </p:sp>
+      <p:cxnSp>
+        <p:nvCxnSpPr>
+          <p:cNvPr id="21" name="直线箭头连接符 20">
+            <a:extLst>
+              <a:ext uri="{FF2B5EF4-FFF2-40B4-BE49-F238E27FC236}">
+                <a16:creationId xmlns:a16="http://schemas.microsoft.com/office/drawing/2014/main" id="{E27F328B-8ECF-274D-9EFE-DAE230E9493A}"/>
+              </a:ext>
+            </a:extLst>
+          </p:cNvPr>
+          <p:cNvCxnSpPr>
+            <a:cxnSpLocks/>
+          </p:cNvCxnSpPr>
+          <p:nvPr/>
+        </p:nvCxnSpPr>
+        <p:spPr>
+          <a:xfrm>
+            <a:off x="3926910" y="2223318"/>
+            <a:ext cx="220755" cy="2510071"/>
+          </a:xfrm>
+          <a:prstGeom prst="straightConnector1">
+            <a:avLst/>
+          </a:prstGeom>
+          <a:ln w="19050" cap="flat" cmpd="sng" algn="ctr">
+            <a:solidFill>
+              <a:schemeClr val="accent5">
+                <a:lumMod val="75000"/>
+              </a:schemeClr>
+            </a:solidFill>
+            <a:prstDash val="solid"/>
+            <a:round/>
+            <a:headEnd type="none" w="med" len="med"/>
+            <a:tailEnd type="arrow"/>
+          </a:ln>
+        </p:spPr>
+        <p:style>
+          <a:lnRef idx="0">
+            <a:scrgbClr r="0" g="0" b="0"/>
+          </a:lnRef>
+          <a:fillRef idx="0">
+            <a:scrgbClr r="0" g="0" b="0"/>
+          </a:fillRef>
+          <a:effectRef idx="0">
+            <a:scrgbClr r="0" g="0" b="0"/>
+          </a:effectRef>
+          <a:fontRef idx="minor">
+            <a:schemeClr val="tx1"/>
+          </a:fontRef>
+        </p:style>
+      </p:cxnSp>
+      <p:cxnSp>
+        <p:nvCxnSpPr>
+          <p:cNvPr id="22" name="直线箭头连接符 21">
+            <a:extLst>
+              <a:ext uri="{FF2B5EF4-FFF2-40B4-BE49-F238E27FC236}">
+                <a16:creationId xmlns:a16="http://schemas.microsoft.com/office/drawing/2014/main" id="{7D368BA7-39D4-C54D-A35A-AF9D2A3D7A5D}"/>
+              </a:ext>
+            </a:extLst>
+          </p:cNvPr>
+          <p:cNvCxnSpPr>
+            <a:cxnSpLocks/>
+          </p:cNvCxnSpPr>
+          <p:nvPr/>
+        </p:nvCxnSpPr>
+        <p:spPr>
+          <a:xfrm>
+            <a:off x="4037287" y="2216559"/>
+            <a:ext cx="146953" cy="1665661"/>
+          </a:xfrm>
+          <a:prstGeom prst="straightConnector1">
+            <a:avLst/>
+          </a:prstGeom>
+          <a:ln w="19050" cap="flat" cmpd="sng" algn="ctr">
+            <a:solidFill>
+              <a:schemeClr val="accent5">
+                <a:lumMod val="75000"/>
+              </a:schemeClr>
+            </a:solidFill>
+            <a:prstDash val="solid"/>
+            <a:round/>
+            <a:headEnd type="none" w="med" len="med"/>
+            <a:tailEnd type="arrow"/>
+          </a:ln>
+        </p:spPr>
+        <p:style>
+          <a:lnRef idx="0">
+            <a:scrgbClr r="0" g="0" b="0"/>
+          </a:lnRef>
+          <a:fillRef idx="0">
+            <a:scrgbClr r="0" g="0" b="0"/>
+          </a:fillRef>
+          <a:effectRef idx="0">
+            <a:scrgbClr r="0" g="0" b="0"/>
+          </a:effectRef>
+          <a:fontRef idx="minor">
+            <a:schemeClr val="tx1"/>
+          </a:fontRef>
+        </p:style>
+      </p:cxnSp>
+      <p:cxnSp>
+        <p:nvCxnSpPr>
+          <p:cNvPr id="24" name="直线箭头连接符 23">
+            <a:extLst>
+              <a:ext uri="{FF2B5EF4-FFF2-40B4-BE49-F238E27FC236}">
+                <a16:creationId xmlns:a16="http://schemas.microsoft.com/office/drawing/2014/main" id="{E6CA2D11-3E85-BD48-9615-98A50875CD27}"/>
+              </a:ext>
+            </a:extLst>
+          </p:cNvPr>
+          <p:cNvCxnSpPr>
+            <a:cxnSpLocks/>
+          </p:cNvCxnSpPr>
+          <p:nvPr/>
+        </p:nvCxnSpPr>
+        <p:spPr>
+          <a:xfrm>
+            <a:off x="4147665" y="2216559"/>
+            <a:ext cx="73150" cy="832185"/>
+          </a:xfrm>
+          <a:prstGeom prst="straightConnector1">
+            <a:avLst/>
+          </a:prstGeom>
+          <a:ln w="19050" cap="flat" cmpd="sng" algn="ctr">
+            <a:solidFill>
+              <a:schemeClr val="accent5">
+                <a:lumMod val="75000"/>
+              </a:schemeClr>
+            </a:solidFill>
+            <a:prstDash val="solid"/>
+            <a:round/>
+            <a:headEnd type="none" w="med" len="med"/>
+            <a:tailEnd type="arrow"/>
+          </a:ln>
+        </p:spPr>
+        <p:style>
+          <a:lnRef idx="0">
+            <a:scrgbClr r="0" g="0" b="0"/>
+          </a:lnRef>
+          <a:fillRef idx="0">
+            <a:scrgbClr r="0" g="0" b="0"/>
+          </a:fillRef>
+          <a:effectRef idx="0">
+            <a:scrgbClr r="0" g="0" b="0"/>
+          </a:effectRef>
+          <a:fontRef idx="minor">
+            <a:schemeClr val="tx1"/>
+          </a:fontRef>
+        </p:style>
+      </p:cxnSp>
+      <p:sp>
+        <p:nvSpPr>
+          <p:cNvPr id="26" name="椭圆 25">
+            <a:extLst>
+              <a:ext uri="{FF2B5EF4-FFF2-40B4-BE49-F238E27FC236}">
+                <a16:creationId xmlns:a16="http://schemas.microsoft.com/office/drawing/2014/main" id="{87CE0384-7E10-164B-9D3C-D324EAD03494}"/>
+              </a:ext>
+            </a:extLst>
+          </p:cNvPr>
+          <p:cNvSpPr/>
+          <p:nvPr/>
+        </p:nvSpPr>
+        <p:spPr>
+          <a:xfrm>
+            <a:off x="4308816" y="3409563"/>
+            <a:ext cx="948984" cy="745958"/>
+          </a:xfrm>
+          <a:prstGeom prst="ellipse">
+            <a:avLst/>
+          </a:prstGeom>
+          <a:solidFill>
+            <a:schemeClr val="accent5">
+              <a:lumMod val="20000"/>
+              <a:lumOff val="80000"/>
+            </a:schemeClr>
+          </a:solidFill>
+          <a:ln>
+            <a:noFill/>
+          </a:ln>
+        </p:spPr>
+        <p:style>
+          <a:lnRef idx="2">
+            <a:schemeClr val="accent1">
+              <a:shade val="50000"/>
+            </a:schemeClr>
+          </a:lnRef>
+          <a:fillRef idx="1">
+            <a:schemeClr val="accent1"/>
+          </a:fillRef>
+          <a:effectRef idx="0">
+            <a:schemeClr val="accent1"/>
+          </a:effectRef>
+          <a:fontRef idx="minor">
+            <a:schemeClr val="lt1"/>
+          </a:fontRef>
+        </p:style>
+        <p:txBody>
+          <a:bodyPr rtlCol="0" anchor="ctr"/>
+          <a:lstStyle/>
+          <a:p>
+            <a:pPr algn="ctr"/>
+            <a:r>
+              <a:rPr kumimoji="1" lang="en-US" altLang="zh-CN" sz="1600" dirty="0">
+                <a:ln>
+                  <a:solidFill>
+                    <a:srgbClr val="FF0000"/>
+                  </a:solidFill>
+                </a:ln>
+              </a:rPr>
+              <a:t>STOP</a:t>
+            </a:r>
+            <a:endParaRPr kumimoji="1" lang="zh-CN" altLang="en-US" sz="1100" dirty="0">
+              <a:ln>
+                <a:solidFill>
+                  <a:srgbClr val="FF0000"/>
+                </a:solidFill>
+              </a:ln>
+            </a:endParaRPr>
+          </a:p>
+        </p:txBody>
+      </p:sp>
+      <p:cxnSp>
+        <p:nvCxnSpPr>
+          <p:cNvPr id="27" name="直线箭头连接符 26">
+            <a:extLst>
+              <a:ext uri="{FF2B5EF4-FFF2-40B4-BE49-F238E27FC236}">
+                <a16:creationId xmlns:a16="http://schemas.microsoft.com/office/drawing/2014/main" id="{BFA0C75A-38AA-B64A-B47C-CB426A5749B1}"/>
+              </a:ext>
+            </a:extLst>
+          </p:cNvPr>
+          <p:cNvCxnSpPr>
+            <a:cxnSpLocks/>
+          </p:cNvCxnSpPr>
+          <p:nvPr/>
+        </p:nvCxnSpPr>
+        <p:spPr>
+          <a:xfrm flipH="1">
+            <a:off x="5478027" y="2221134"/>
+            <a:ext cx="189260" cy="2504203"/>
+          </a:xfrm>
+          <a:prstGeom prst="straightConnector1">
+            <a:avLst/>
+          </a:prstGeom>
+          <a:ln w="19050" cap="flat" cmpd="sng" algn="ctr">
+            <a:solidFill>
+              <a:schemeClr val="accent5">
+                <a:lumMod val="75000"/>
+              </a:schemeClr>
+            </a:solidFill>
+            <a:prstDash val="solid"/>
+            <a:round/>
+            <a:headEnd type="arrow" w="med" len="med"/>
+            <a:tailEnd type="none"/>
+          </a:ln>
+        </p:spPr>
+        <p:style>
+          <a:lnRef idx="0">
+            <a:scrgbClr r="0" g="0" b="0"/>
+          </a:lnRef>
+          <a:fillRef idx="0">
+            <a:scrgbClr r="0" g="0" b="0"/>
+          </a:fillRef>
+          <a:effectRef idx="0">
+            <a:scrgbClr r="0" g="0" b="0"/>
+          </a:effectRef>
+          <a:fontRef idx="minor">
+            <a:schemeClr val="tx1"/>
+          </a:fontRef>
+        </p:style>
+      </p:cxnSp>
+      <p:cxnSp>
+        <p:nvCxnSpPr>
+          <p:cNvPr id="28" name="直线箭头连接符 27">
+            <a:extLst>
+              <a:ext uri="{FF2B5EF4-FFF2-40B4-BE49-F238E27FC236}">
+                <a16:creationId xmlns:a16="http://schemas.microsoft.com/office/drawing/2014/main" id="{D67DDFE7-C77A-BB4F-B38E-8AE4C7A54018}"/>
+              </a:ext>
+            </a:extLst>
+          </p:cNvPr>
+          <p:cNvCxnSpPr>
+            <a:cxnSpLocks/>
+          </p:cNvCxnSpPr>
+          <p:nvPr/>
+        </p:nvCxnSpPr>
+        <p:spPr>
+          <a:xfrm flipH="1">
+            <a:off x="5414211" y="2223318"/>
+            <a:ext cx="123976" cy="1658902"/>
+          </a:xfrm>
+          <a:prstGeom prst="straightConnector1">
+            <a:avLst/>
+          </a:prstGeom>
+          <a:ln w="19050" cap="flat" cmpd="sng" algn="ctr">
+            <a:solidFill>
+              <a:schemeClr val="accent5">
+                <a:lumMod val="75000"/>
+              </a:schemeClr>
+            </a:solidFill>
+            <a:prstDash val="solid"/>
+            <a:round/>
+            <a:headEnd type="arrow" w="med" len="med"/>
+            <a:tailEnd type="none"/>
+          </a:ln>
+        </p:spPr>
+        <p:style>
+          <a:lnRef idx="0">
+            <a:scrgbClr r="0" g="0" b="0"/>
+          </a:lnRef>
+          <a:fillRef idx="0">
+            <a:scrgbClr r="0" g="0" b="0"/>
+          </a:fillRef>
+          <a:effectRef idx="0">
+            <a:scrgbClr r="0" g="0" b="0"/>
+          </a:effectRef>
+          <a:fontRef idx="minor">
+            <a:schemeClr val="tx1"/>
+          </a:fontRef>
+        </p:style>
+      </p:cxnSp>
+      <p:cxnSp>
+        <p:nvCxnSpPr>
+          <p:cNvPr id="31" name="直线箭头连接符 30">
+            <a:extLst>
+              <a:ext uri="{FF2B5EF4-FFF2-40B4-BE49-F238E27FC236}">
+                <a16:creationId xmlns:a16="http://schemas.microsoft.com/office/drawing/2014/main" id="{F42441C0-F5D1-0944-A9DD-7EF92C2F9F60}"/>
+              </a:ext>
+            </a:extLst>
+          </p:cNvPr>
+          <p:cNvCxnSpPr>
+            <a:cxnSpLocks/>
+          </p:cNvCxnSpPr>
+          <p:nvPr/>
+        </p:nvCxnSpPr>
+        <p:spPr>
+          <a:xfrm flipH="1">
+            <a:off x="5353093" y="2228785"/>
+            <a:ext cx="61054" cy="826718"/>
+          </a:xfrm>
+          <a:prstGeom prst="straightConnector1">
+            <a:avLst/>
+          </a:prstGeom>
+          <a:ln w="19050" cap="flat" cmpd="sng" algn="ctr">
+            <a:solidFill>
+              <a:schemeClr val="accent5">
+                <a:lumMod val="75000"/>
+              </a:schemeClr>
+            </a:solidFill>
+            <a:prstDash val="solid"/>
+            <a:round/>
+            <a:headEnd type="arrow" w="med" len="med"/>
+            <a:tailEnd type="none"/>
+          </a:ln>
+        </p:spPr>
+        <p:style>
+          <a:lnRef idx="0">
+            <a:scrgbClr r="0" g="0" b="0"/>
+          </a:lnRef>
+          <a:fillRef idx="0">
+            <a:scrgbClr r="0" g="0" b="0"/>
+          </a:fillRef>
+          <a:effectRef idx="0">
+            <a:scrgbClr r="0" g="0" b="0"/>
+          </a:effectRef>
+          <a:fontRef idx="minor">
+            <a:schemeClr val="tx1"/>
+          </a:fontRef>
+        </p:style>
+      </p:cxnSp>
+      <p:sp>
+        <p:nvSpPr>
+          <p:cNvPr id="33" name="文本框 32">
+            <a:extLst>
+              <a:ext uri="{FF2B5EF4-FFF2-40B4-BE49-F238E27FC236}">
+                <a16:creationId xmlns:a16="http://schemas.microsoft.com/office/drawing/2014/main" id="{A9194922-E712-8A4D-AD15-0246A3CA7E64}"/>
+              </a:ext>
+            </a:extLst>
+          </p:cNvPr>
+          <p:cNvSpPr txBox="1"/>
+          <p:nvPr/>
+        </p:nvSpPr>
+        <p:spPr>
+          <a:xfrm>
+            <a:off x="4858949" y="1743635"/>
+            <a:ext cx="1314784" cy="369332"/>
+          </a:xfrm>
+          <a:prstGeom prst="rect">
+            <a:avLst/>
+          </a:prstGeom>
+          <a:noFill/>
+        </p:spPr>
+        <p:txBody>
+          <a:bodyPr wrap="none" rtlCol="0">
+            <a:spAutoFit/>
+          </a:bodyPr>
+          <a:lstStyle/>
+          <a:p>
+            <a:r>
+              <a:rPr kumimoji="1" lang="en-US" altLang="zh-CN" dirty="0"/>
+              <a:t>Config-Ack</a:t>
+            </a:r>
+            <a:endParaRPr kumimoji="1" lang="zh-CN" altLang="en-US" dirty="0"/>
+          </a:p>
+        </p:txBody>
+      </p:sp>
+      <p:sp>
+        <p:nvSpPr>
+          <p:cNvPr id="34" name="文本框 33">
+            <a:extLst>
+              <a:ext uri="{FF2B5EF4-FFF2-40B4-BE49-F238E27FC236}">
+                <a16:creationId xmlns:a16="http://schemas.microsoft.com/office/drawing/2014/main" id="{8EAAE1D8-41DF-1149-B558-3D91A6E1FA3D}"/>
+              </a:ext>
+            </a:extLst>
+          </p:cNvPr>
+          <p:cNvSpPr txBox="1"/>
+          <p:nvPr/>
+        </p:nvSpPr>
+        <p:spPr>
+          <a:xfrm>
+            <a:off x="6411461" y="1757303"/>
+            <a:ext cx="1742785" cy="369332"/>
+          </a:xfrm>
+          <a:prstGeom prst="rect">
+            <a:avLst/>
+          </a:prstGeom>
+          <a:noFill/>
+        </p:spPr>
+        <p:txBody>
+          <a:bodyPr wrap="none" rtlCol="0">
+            <a:spAutoFit/>
+          </a:bodyPr>
+          <a:lstStyle/>
+          <a:p>
+            <a:r>
+              <a:rPr kumimoji="1" lang="en-US" altLang="zh-CN" dirty="0"/>
+              <a:t>Config-Commit</a:t>
+            </a:r>
+            <a:endParaRPr kumimoji="1" lang="zh-CN" altLang="en-US" dirty="0"/>
+          </a:p>
+        </p:txBody>
+      </p:sp>
+      <p:cxnSp>
+        <p:nvCxnSpPr>
+          <p:cNvPr id="35" name="直线箭头连接符 34">
+            <a:extLst>
+              <a:ext uri="{FF2B5EF4-FFF2-40B4-BE49-F238E27FC236}">
+                <a16:creationId xmlns:a16="http://schemas.microsoft.com/office/drawing/2014/main" id="{1B8A0546-56C5-A445-A6DA-AEFA6BE9C4A3}"/>
+              </a:ext>
+            </a:extLst>
+          </p:cNvPr>
+          <p:cNvCxnSpPr>
+            <a:cxnSpLocks/>
+          </p:cNvCxnSpPr>
+          <p:nvPr/>
+        </p:nvCxnSpPr>
+        <p:spPr>
+          <a:xfrm>
+            <a:off x="7086782" y="2223318"/>
+            <a:ext cx="220755" cy="2510071"/>
+          </a:xfrm>
+          <a:prstGeom prst="straightConnector1">
+            <a:avLst/>
+          </a:prstGeom>
+          <a:ln w="19050" cap="flat" cmpd="sng" algn="ctr">
+            <a:solidFill>
+              <a:schemeClr val="accent5">
+                <a:lumMod val="75000"/>
+              </a:schemeClr>
+            </a:solidFill>
+            <a:prstDash val="solid"/>
+            <a:round/>
+            <a:headEnd type="none" w="med" len="med"/>
+            <a:tailEnd type="arrow"/>
+          </a:ln>
+        </p:spPr>
+        <p:style>
+          <a:lnRef idx="0">
+            <a:scrgbClr r="0" g="0" b="0"/>
+          </a:lnRef>
+          <a:fillRef idx="0">
+            <a:scrgbClr r="0" g="0" b="0"/>
+          </a:fillRef>
+          <a:effectRef idx="0">
+            <a:scrgbClr r="0" g="0" b="0"/>
+          </a:effectRef>
+          <a:fontRef idx="minor">
+            <a:schemeClr val="tx1"/>
+          </a:fontRef>
+        </p:style>
+      </p:cxnSp>
+      <p:cxnSp>
+        <p:nvCxnSpPr>
+          <p:cNvPr id="36" name="直线箭头连接符 35">
+            <a:extLst>
+              <a:ext uri="{FF2B5EF4-FFF2-40B4-BE49-F238E27FC236}">
+                <a16:creationId xmlns:a16="http://schemas.microsoft.com/office/drawing/2014/main" id="{F6BB77AE-ED72-B04F-B33C-6CAEB7262D88}"/>
+              </a:ext>
+            </a:extLst>
+          </p:cNvPr>
+          <p:cNvCxnSpPr>
+            <a:cxnSpLocks/>
+          </p:cNvCxnSpPr>
+          <p:nvPr/>
+        </p:nvCxnSpPr>
+        <p:spPr>
+          <a:xfrm>
+            <a:off x="7197159" y="2216559"/>
+            <a:ext cx="146953" cy="1665661"/>
+          </a:xfrm>
+          <a:prstGeom prst="straightConnector1">
+            <a:avLst/>
+          </a:prstGeom>
+          <a:ln w="19050" cap="flat" cmpd="sng" algn="ctr">
+            <a:solidFill>
+              <a:schemeClr val="accent5">
+                <a:lumMod val="75000"/>
+              </a:schemeClr>
+            </a:solidFill>
+            <a:prstDash val="solid"/>
+            <a:round/>
+            <a:headEnd type="none" w="med" len="med"/>
+            <a:tailEnd type="arrow"/>
+          </a:ln>
+        </p:spPr>
+        <p:style>
+          <a:lnRef idx="0">
+            <a:scrgbClr r="0" g="0" b="0"/>
+          </a:lnRef>
+          <a:fillRef idx="0">
+            <a:scrgbClr r="0" g="0" b="0"/>
+          </a:fillRef>
+          <a:effectRef idx="0">
+            <a:scrgbClr r="0" g="0" b="0"/>
+          </a:effectRef>
+          <a:fontRef idx="minor">
+            <a:schemeClr val="tx1"/>
+          </a:fontRef>
+        </p:style>
+      </p:cxnSp>
+      <p:cxnSp>
+        <p:nvCxnSpPr>
+          <p:cNvPr id="37" name="直线箭头连接符 36">
+            <a:extLst>
+              <a:ext uri="{FF2B5EF4-FFF2-40B4-BE49-F238E27FC236}">
+                <a16:creationId xmlns:a16="http://schemas.microsoft.com/office/drawing/2014/main" id="{0B76C77B-AB28-1640-84CD-E707D4D6EC46}"/>
+              </a:ext>
+            </a:extLst>
+          </p:cNvPr>
+          <p:cNvCxnSpPr>
+            <a:cxnSpLocks/>
+          </p:cNvCxnSpPr>
+          <p:nvPr/>
+        </p:nvCxnSpPr>
+        <p:spPr>
+          <a:xfrm>
+            <a:off x="7307537" y="2216559"/>
+            <a:ext cx="73150" cy="832185"/>
+          </a:xfrm>
+          <a:prstGeom prst="straightConnector1">
+            <a:avLst/>
+          </a:prstGeom>
+          <a:ln w="19050" cap="flat" cmpd="sng" algn="ctr">
+            <a:solidFill>
+              <a:schemeClr val="accent5">
+                <a:lumMod val="75000"/>
+              </a:schemeClr>
+            </a:solidFill>
+            <a:prstDash val="solid"/>
+            <a:round/>
+            <a:headEnd type="none" w="med" len="med"/>
+            <a:tailEnd type="arrow"/>
+          </a:ln>
+        </p:spPr>
+        <p:style>
+          <a:lnRef idx="0">
+            <a:scrgbClr r="0" g="0" b="0"/>
+          </a:lnRef>
+          <a:fillRef idx="0">
+            <a:scrgbClr r="0" g="0" b="0"/>
+          </a:fillRef>
+          <a:effectRef idx="0">
+            <a:scrgbClr r="0" g="0" b="0"/>
+          </a:effectRef>
+          <a:fontRef idx="minor">
+            <a:schemeClr val="tx1"/>
+          </a:fontRef>
+        </p:style>
+      </p:cxnSp>
+      <p:sp>
+        <p:nvSpPr>
+          <p:cNvPr id="38" name="文本框 37">
+            <a:extLst>
+              <a:ext uri="{FF2B5EF4-FFF2-40B4-BE49-F238E27FC236}">
+                <a16:creationId xmlns:a16="http://schemas.microsoft.com/office/drawing/2014/main" id="{1C2DBB64-B256-6746-ADA8-EB622C9D375E}"/>
+              </a:ext>
+            </a:extLst>
+          </p:cNvPr>
+          <p:cNvSpPr txBox="1"/>
+          <p:nvPr/>
+        </p:nvSpPr>
+        <p:spPr>
+          <a:xfrm>
+            <a:off x="7417914" y="3296038"/>
+            <a:ext cx="1386918" cy="461665"/>
+          </a:xfrm>
+          <a:prstGeom prst="rect">
+            <a:avLst/>
+          </a:prstGeom>
+          <a:noFill/>
+        </p:spPr>
+        <p:txBody>
+          <a:bodyPr wrap="none" rtlCol="0">
+            <a:spAutoFit/>
+          </a:bodyPr>
+          <a:lstStyle/>
+          <a:p>
+            <a:r>
+              <a:rPr kumimoji="1" lang="en-US" altLang="zh-CN" sz="2400" dirty="0"/>
+              <a:t>Recovery</a:t>
+            </a:r>
+            <a:endParaRPr kumimoji="1" lang="zh-CN" altLang="en-US" sz="2400" dirty="0"/>
+          </a:p>
+        </p:txBody>
+      </p:sp>
+      <p:sp>
+        <p:nvSpPr>
+          <p:cNvPr id="39" name="文本框 38">
+            <a:extLst>
+              <a:ext uri="{FF2B5EF4-FFF2-40B4-BE49-F238E27FC236}">
+                <a16:creationId xmlns:a16="http://schemas.microsoft.com/office/drawing/2014/main" id="{3DCD2913-0C27-394F-BF11-CF00843A3356}"/>
+              </a:ext>
+            </a:extLst>
+          </p:cNvPr>
+          <p:cNvSpPr txBox="1"/>
+          <p:nvPr/>
+        </p:nvSpPr>
+        <p:spPr>
+          <a:xfrm>
+            <a:off x="9634752" y="3296037"/>
             <a:ext cx="1308371" cy="461665"/>
           </a:xfrm>
           <a:prstGeom prst="rect">
@@ -25460,10 +25987,10 @@
       </p:sp>
       <p:sp>
         <p:nvSpPr>
-          <p:cNvPr id="39" name="文本框 38">
+          <p:cNvPr id="40" name="文本框 39">
             <a:extLst>
               <a:ext uri="{FF2B5EF4-FFF2-40B4-BE49-F238E27FC236}">
-                <a16:creationId xmlns:a16="http://schemas.microsoft.com/office/drawing/2014/main" id="{E9070C82-B548-CC44-89D2-548582D4C238}"/>
+                <a16:creationId xmlns:a16="http://schemas.microsoft.com/office/drawing/2014/main" id="{1DC4FFAF-0CDB-DE48-ADF3-49DF3CA46F47}"/>
               </a:ext>
             </a:extLst>
           </p:cNvPr>
@@ -25514,7 +26041,7 @@
     </p:spTree>
     <p:extLst>
       <p:ext uri="{BB962C8B-B14F-4D97-AF65-F5344CB8AC3E}">
-        <p14:creationId xmlns:p14="http://schemas.microsoft.com/office/powerpoint/2010/main" val="2049327847"/>
+        <p14:creationId xmlns:p14="http://schemas.microsoft.com/office/powerpoint/2010/main" val="548468374"/>
       </p:ext>
     </p:extLst>
   </p:cSld>
@@ -25555,7 +26082,7 @@
                                           </p:stCondLst>
                                         </p:cTn>
                                         <p:tgtEl>
-                                          <p:spTgt spid="23"/>
+                                          <p:spTgt spid="40"/>
                                         </p:tgtEl>
                                         <p:attrNameLst>
                                           <p:attrName>style.visibility</p:attrName>
@@ -25569,60 +26096,7 @@
                                       <p:cBhvr>
                                         <p:cTn id="7" dur="500"/>
                                         <p:tgtEl>
-                                          <p:spTgt spid="23"/>
-                                        </p:tgtEl>
-                                      </p:cBhvr>
-                                    </p:animEffect>
-                                  </p:childTnLst>
-                                </p:cTn>
-                              </p:par>
-                            </p:childTnLst>
-                          </p:cTn>
-                        </p:par>
-                      </p:childTnLst>
-                    </p:cTn>
-                  </p:par>
-                  <p:par>
-                    <p:cTn id="8" fill="hold">
-                      <p:stCondLst>
-                        <p:cond delay="indefinite"/>
-                      </p:stCondLst>
-                      <p:childTnLst>
-                        <p:par>
-                          <p:cTn id="9" fill="hold">
-                            <p:stCondLst>
-                              <p:cond delay="0"/>
-                            </p:stCondLst>
-                            <p:childTnLst>
-                              <p:par>
-                                <p:cTn id="10" presetID="10" presetClass="entr" presetSubtype="0" fill="hold" grpId="0" nodeType="clickEffect">
-                                  <p:stCondLst>
-                                    <p:cond delay="0"/>
-                                  </p:stCondLst>
-                                  <p:childTnLst>
-                                    <p:set>
-                                      <p:cBhvr>
-                                        <p:cTn id="11" dur="1" fill="hold">
-                                          <p:stCondLst>
-                                            <p:cond delay="0"/>
-                                          </p:stCondLst>
-                                        </p:cTn>
-                                        <p:tgtEl>
-                                          <p:spTgt spid="39"/>
-                                        </p:tgtEl>
-                                        <p:attrNameLst>
-                                          <p:attrName>style.visibility</p:attrName>
-                                        </p:attrNameLst>
-                                      </p:cBhvr>
-                                      <p:to>
-                                        <p:strVal val="visible"/>
-                                      </p:to>
-                                    </p:set>
-                                    <p:animEffect transition="in" filter="fade">
-                                      <p:cBhvr>
-                                        <p:cTn id="12" dur="500"/>
-                                        <p:tgtEl>
-                                          <p:spTgt spid="39"/>
+                                          <p:spTgt spid="40"/>
                                         </p:tgtEl>
                                       </p:cBhvr>
                                     </p:animEffect>
@@ -25657,8 +26131,7 @@
       </p:par>
     </p:tnLst>
     <p:bldLst>
-      <p:bldP spid="23" grpId="0"/>
-      <p:bldP spid="39" grpId="0"/>
+      <p:bldP spid="40" grpId="0"/>
     </p:bldLst>
   </p:timing>
 </p:sld>
@@ -29114,6 +29587,36 @@
           </a:p>
         </p:txBody>
       </p:sp>
+      <p:pic>
+        <p:nvPicPr>
+          <p:cNvPr id="4" name="图片 3">
+            <a:extLst>
+              <a:ext uri="{FF2B5EF4-FFF2-40B4-BE49-F238E27FC236}">
+                <a16:creationId xmlns:a16="http://schemas.microsoft.com/office/drawing/2014/main" id="{F3F66352-0F24-914B-A25D-655A0001567C}"/>
+              </a:ext>
+            </a:extLst>
+          </p:cNvPr>
+          <p:cNvPicPr>
+            <a:picLocks noChangeAspect="1"/>
+          </p:cNvPicPr>
+          <p:nvPr/>
+        </p:nvPicPr>
+        <p:blipFill>
+          <a:blip r:embed="rId2"/>
+          <a:stretch>
+            <a:fillRect/>
+          </a:stretch>
+        </p:blipFill>
+        <p:spPr>
+          <a:xfrm>
+            <a:off x="6096000" y="1803400"/>
+            <a:ext cx="3251200" cy="3251200"/>
+          </a:xfrm>
+          <a:prstGeom prst="rect">
+            <a:avLst/>
+          </a:prstGeom>
+        </p:spPr>
+      </p:pic>
     </p:spTree>
     <p:extLst>
       <p:ext uri="{BB962C8B-B14F-4D97-AF65-F5344CB8AC3E}">

</xml_diff>